<commit_message>
Finished my share of the slides
~
</commit_message>
<xml_diff>
--- a/Presentation/Presentation.pptx
+++ b/Presentation/Presentation.pptx
@@ -15,6 +15,8 @@
     <p:sldId id="263" r:id="rId9"/>
     <p:sldId id="264" r:id="rId10"/>
     <p:sldId id="265" r:id="rId11"/>
+    <p:sldId id="266" r:id="rId12"/>
+    <p:sldId id="267" r:id="rId13"/>
   </p:sldIdLst>
   <p:sldSz cx="9144000" cy="5143500" type="screen16x9"/>
   <p:notesSz cx="6858000" cy="9144000"/>
@@ -3154,6 +3156,10 @@
             </a:pPr>
             <a:br/>
             <a:br/>
+            <a:r>
+              <a:rPr/>
+              <a:t>Juan Gonzalez, Aaron Graff, Ilijah Pearson, Hope Winsor</a:t>
+            </a:r>
           </a:p>
         </p:txBody>
       </p:sp>
@@ -3199,11 +3205,160 @@
             </a:pPr>
             <a:r>
               <a:rPr/>
-              <a:t>Sources</a:t>
-            </a:r>
-          </a:p>
-        </p:txBody>
-      </p:sp>
+              <a:t>References</a:t>
+            </a:r>
+          </a:p>
+        </p:txBody>
+      </p:sp>
+      <p:sp>
+        <p:nvSpPr>
+          <p:cNvPr id="3" name="Content Placeholder 2"/>
+          <p:cNvSpPr>
+            <a:spLocks noGrp="1"/>
+          </p:cNvSpPr>
+          <p:nvPr>
+            <p:ph idx="1"/>
+          </p:nvPr>
+        </p:nvSpPr>
+        <p:spPr/>
+        <p:txBody>
+          <a:bodyPr/>
+          <a:lstStyle/>
+          <a:p>
+            <a:pPr lvl="0" indent="0" marL="0">
+              <a:buNone/>
+            </a:pPr>
+            <a:r>
+              <a:rPr/>
+              <a:t>-https://www.kaggle.com/datasets/davidjfisher/illinois-doc-labeled-faces-dataset -https://www.idoc.state.il.us</a:t>
+            </a:r>
+          </a:p>
+        </p:txBody>
+      </p:sp>
+    </p:spTree>
+  </p:cSld>
+</p:sld>
+</file>
+
+<file path=ppt/slides/slide11.xml><?xml version="1.0" encoding="utf-8"?>
+<p:sld xmlns:a="http://schemas.openxmlformats.org/drawingml/2006/main" xmlns:r="http://schemas.openxmlformats.org/officeDocument/2006/relationships" xmlns:p="http://schemas.openxmlformats.org/presentationml/2006/main">
+  <p:cSld>
+    <p:spTree>
+      <p:nvGrpSpPr>
+        <p:cNvPr id="1" name=""/>
+        <p:cNvGrpSpPr/>
+        <p:nvPr/>
+      </p:nvGrpSpPr>
+      <p:grpSpPr>
+        <a:xfrm>
+          <a:off x="0" y="0"/>
+          <a:ext cx="0" cy="0"/>
+          <a:chOff x="0" y="0"/>
+          <a:chExt cx="0" cy="0"/>
+        </a:xfrm>
+      </p:grpSpPr>
+      <p:sp>
+        <p:nvSpPr>
+          <p:cNvPr id="2" name="Title 1"/>
+          <p:cNvSpPr>
+            <a:spLocks noGrp="1"/>
+          </p:cNvSpPr>
+          <p:nvPr>
+            <p:ph type="title"/>
+          </p:nvPr>
+        </p:nvSpPr>
+        <p:spPr/>
+        <p:txBody>
+          <a:bodyPr/>
+          <a:lstStyle/>
+          <a:p>
+            <a:pPr lvl="0" indent="0" marL="0">
+              <a:buNone/>
+            </a:pPr>
+            <a:r>
+              <a:rPr/>
+              <a:t>Questions?</a:t>
+            </a:r>
+          </a:p>
+        </p:txBody>
+      </p:sp>
+    </p:spTree>
+  </p:cSld>
+</p:sld>
+</file>
+
+<file path=ppt/slides/slide12.xml><?xml version="1.0" encoding="utf-8"?>
+<p:sld xmlns:a="http://schemas.openxmlformats.org/drawingml/2006/main" xmlns:r="http://schemas.openxmlformats.org/officeDocument/2006/relationships" xmlns:p="http://schemas.openxmlformats.org/presentationml/2006/main">
+  <p:cSld>
+    <p:spTree>
+      <p:nvGrpSpPr>
+        <p:cNvPr id="1" name=""/>
+        <p:cNvGrpSpPr/>
+        <p:nvPr/>
+      </p:nvGrpSpPr>
+      <p:grpSpPr>
+        <a:xfrm>
+          <a:off x="0" y="0"/>
+          <a:ext cx="0" cy="0"/>
+          <a:chOff x="0" y="0"/>
+          <a:chExt cx="0" cy="0"/>
+        </a:xfrm>
+      </p:grpSpPr>
+      <p:sp>
+        <p:nvSpPr>
+          <p:cNvPr id="2" name="Title 1"/>
+          <p:cNvSpPr>
+            <a:spLocks noGrp="1"/>
+          </p:cNvSpPr>
+          <p:nvPr>
+            <p:ph type="title"/>
+          </p:nvPr>
+        </p:nvSpPr>
+        <p:spPr/>
+        <p:txBody>
+          <a:bodyPr/>
+          <a:lstStyle/>
+          <a:p>
+            <a:pPr lvl="0" indent="0" marL="0">
+              <a:buNone/>
+            </a:pPr>
+            <a:r>
+              <a:rPr/>
+              <a:t>Bonus Slides - Complete Variable Importance for RF</a:t>
+            </a:r>
+          </a:p>
+        </p:txBody>
+      </p:sp>
+      <p:pic>
+        <p:nvPicPr>
+          <p:cNvPr descr="Presentation_files/figure-pptx/unnamed-chunk-3-1.png" id="0" name="Picture 1"/>
+          <p:cNvPicPr>
+            <a:picLocks noGrp="1" noChangeAspect="1"/>
+          </p:cNvPicPr>
+          <p:nvPr/>
+        </p:nvPicPr>
+        <p:blipFill>
+          <a:blip r:embed="rId2"/>
+          <a:stretch>
+            <a:fillRect/>
+          </a:stretch>
+        </p:blipFill>
+        <p:spPr bwMode="auto">
+          <a:xfrm>
+            <a:off x="2108200" y="1193800"/>
+            <a:ext cx="4927600" cy="3390900"/>
+          </a:xfrm>
+          <a:prstGeom prst="rect">
+            <a:avLst/>
+          </a:prstGeom>
+          <a:noFill/>
+          <a:ln w="9525">
+            <a:noFill/>
+            <a:headEnd/>
+            <a:tailEnd/>
+          </a:ln>
+        </p:spPr>
+      </p:pic>
     </p:spTree>
   </p:cSld>
 </p:sld>
@@ -3246,7 +3401,7 @@
             </a:pPr>
             <a:r>
               <a:rPr/>
-              <a:t>DATASET</a:t>
+              <a:t>Dataset and Preparation</a:t>
             </a:r>
           </a:p>
         </p:txBody>
@@ -3271,21 +3426,35 @@
             </a:pPr>
             <a:r>
               <a:rPr/>
-              <a:t>The dataset we are focusing our project on is Illinois Department Of Corrections Labeled Faces.</a:t>
+              <a:t>Our data comes from Kaggle, it consists of 3 CSV files with data scraped off the Illinois Department Of Corrections website.</a:t>
             </a:r>
           </a:p>
           <a:p>
             <a:pPr lvl="0"/>
             <a:r>
               <a:rPr/>
-              <a:t>68149 Booking photographs along with information about their sentencing length, criminal history, type of crime, physical descriptors, and demographics.</a:t>
+              <a:t>Contains information 61,052 individuals who have been incarcerated in Illinois from 1952-2018.</a:t>
             </a:r>
           </a:p>
           <a:p>
             <a:pPr lvl="0"/>
             <a:r>
               <a:rPr/>
-              <a:t>Hosted on Kaggle the data was scrapped from the Illinois Department of Corrections website https://www.idoc.state.il.us</a:t>
+              <a:t>“Person” dataset includes simple descriptive information on the person: Name, DOB, Sentencing Date, Race, Eye Color, Hair Color, etc…</a:t>
+            </a:r>
+          </a:p>
+          <a:p>
+            <a:pPr lvl="0"/>
+            <a:r>
+              <a:rPr/>
+              <a:t>“Marks” has multiple rows per person listing any additional descriptive features like scars and tattoos.</a:t>
+            </a:r>
+          </a:p>
+          <a:p>
+            <a:pPr lvl="0"/>
+            <a:r>
+              <a:rPr/>
+              <a:t>“Sentencing” is information on the charges faced by the individual, the crime categorized by Illinois’ felony classes, and our response variable, sentencing time.</a:t>
             </a:r>
           </a:p>
         </p:txBody>
@@ -3378,6 +3547,104 @@
                                           <p:spTgt spid="3">
                                             <p:txEl>
                                               <p:pRg st="2" end="2"/>
+                                            </p:txEl>
+                                          </p:spTgt>
+                                        </p:tgtEl>
+                                        <p:attrNameLst>
+                                          <p:attrName>style.visibility</p:attrName>
+                                        </p:attrNameLst>
+                                      </p:cBhvr>
+                                      <p:to>
+                                        <p:strVal val="visible"/>
+                                      </p:to>
+                                    </p:set>
+                                  </p:childTnLst>
+                                </p:cTn>
+                              </p:par>
+                            </p:childTnLst>
+                          </p:cTn>
+                        </p:par>
+                      </p:childTnLst>
+                    </p:cTn>
+                  </p:par>
+                  <p:par>
+                    <p:cTn id="11" fill="hold">
+                      <p:stCondLst>
+                        <p:cond delay="indefinite"/>
+                      </p:stCondLst>
+                      <p:childTnLst>
+                        <p:par>
+                          <p:cTn id="12" fill="hold">
+                            <p:stCondLst>
+                              <p:cond delay="0"/>
+                            </p:stCondLst>
+                            <p:childTnLst>
+                              <p:par>
+                                <p:cTn id="13" presetID="1" presetClass="entr" presetSubtype="0" fill="hold" grpId="0" nodeType="clickEffect">
+                                  <p:stCondLst>
+                                    <p:cond delay="0"/>
+                                  </p:stCondLst>
+                                  <p:childTnLst>
+                                    <p:set>
+                                      <p:cBhvr>
+                                        <p:cTn id="14" dur="1" fill="hold">
+                                          <p:stCondLst>
+                                            <p:cond delay="0"/>
+                                          </p:stCondLst>
+                                        </p:cTn>
+                                        <p:tgtEl>
+                                          <p:spTgt spid="3">
+                                            <p:txEl>
+                                              <p:pRg st="3" end="3"/>
+                                            </p:txEl>
+                                          </p:spTgt>
+                                        </p:tgtEl>
+                                        <p:attrNameLst>
+                                          <p:attrName>style.visibility</p:attrName>
+                                        </p:attrNameLst>
+                                      </p:cBhvr>
+                                      <p:to>
+                                        <p:strVal val="visible"/>
+                                      </p:to>
+                                    </p:set>
+                                  </p:childTnLst>
+                                </p:cTn>
+                              </p:par>
+                            </p:childTnLst>
+                          </p:cTn>
+                        </p:par>
+                      </p:childTnLst>
+                    </p:cTn>
+                  </p:par>
+                  <p:par>
+                    <p:cTn id="15" fill="hold">
+                      <p:stCondLst>
+                        <p:cond delay="indefinite"/>
+                      </p:stCondLst>
+                      <p:childTnLst>
+                        <p:par>
+                          <p:cTn id="16" fill="hold">
+                            <p:stCondLst>
+                              <p:cond delay="0"/>
+                            </p:stCondLst>
+                            <p:childTnLst>
+                              <p:par>
+                                <p:cTn id="17" presetID="1" presetClass="entr" presetSubtype="0" fill="hold" grpId="0" nodeType="clickEffect">
+                                  <p:stCondLst>
+                                    <p:cond delay="0"/>
+                                  </p:stCondLst>
+                                  <p:childTnLst>
+                                    <p:set>
+                                      <p:cBhvr>
+                                        <p:cTn id="18" dur="1" fill="hold">
+                                          <p:stCondLst>
+                                            <p:cond delay="0"/>
+                                          </p:stCondLst>
+                                        </p:cTn>
+                                        <p:tgtEl>
+                                          <p:spTgt spid="3">
+                                            <p:txEl>
+                                              <p:pRg st="4" end="4"/>
                                             </p:txEl>
                                           </p:spTgt>
                                         </p:tgtEl>
@@ -3783,7 +4050,7 @@
             </a:pPr>
             <a:r>
               <a:rPr/>
-              <a:t>Data Preparation</a:t>
+              <a:t>KNN</a:t>
             </a:r>
           </a:p>
         </p:txBody>
@@ -3830,7 +4097,7 @@
             </a:pPr>
             <a:r>
               <a:rPr/>
-              <a:t>KNN</a:t>
+              <a:t>Linear Regression</a:t>
             </a:r>
           </a:p>
         </p:txBody>
@@ -3877,7 +4144,7 @@
             </a:pPr>
             <a:r>
               <a:rPr/>
-              <a:t>Linear Regression</a:t>
+              <a:t>GAM</a:t>
             </a:r>
           </a:p>
         </p:txBody>
@@ -3924,11 +4191,104 @@
             </a:pPr>
             <a:r>
               <a:rPr/>
-              <a:t>GAM</a:t>
-            </a:r>
-          </a:p>
-        </p:txBody>
-      </p:sp>
+              <a:t>Random Forest</a:t>
+            </a:r>
+          </a:p>
+        </p:txBody>
+      </p:sp>
+      <mc:AlternateContent xmlns:mc="http://schemas.openxmlformats.org/markup-compatibility/2006">
+        <mc:Choice xmlns:a14="http://schemas.microsoft.com/office/drawing/2010/main" Requires="a14">
+          <p:sp>
+            <p:nvSpPr>
+              <p:cNvPr id="3" name="Content Placeholder 2"/>
+              <p:cNvSpPr>
+                <a:spLocks noGrp="1"/>
+              </p:cNvSpPr>
+              <p:nvPr>
+                <p:ph idx="1" sz="half"/>
+              </p:nvPr>
+            </p:nvSpPr>
+            <p:spPr/>
+            <p:txBody>
+              <a:bodyPr/>
+              <a:lstStyle/>
+              <a:p>
+                <a:pPr lvl="0"/>
+                <a:r>
+                  <a:rPr/>
+                  <a:t>Chosen to deal with correlation amongst trees.</a:t>
+                </a:r>
+              </a:p>
+              <a:p>
+                <a:pPr lvl="0"/>
+                <a:r>
+                  <a:rPr/>
+                  <a:t>58,836 observations. 70:30 Split </a:t>
+                </a:r>
+                <a14:m>
+                  <m:oMath xmlns:m="http://schemas.openxmlformats.org/officeDocument/2006/math">
+                    <m:r>
+                      <m:rPr>
+                        <m:sty m:val="p"/>
+                      </m:rPr>
+                      <m:t>∼</m:t>
+                    </m:r>
+                  </m:oMath>
+                </a14:m>
+                <a:r>
+                  <a:rPr/>
+                  <a:t> (41,200 | 17,600)</a:t>
+                </a:r>
+              </a:p>
+              <a:p>
+                <a:pPr lvl="0"/>
+                <a:r>
+                  <a:rPr/>
+                  <a:t>Fit 500 trees with 4 randomly chosen predictors for each tree.</a:t>
+                </a:r>
+              </a:p>
+              <a:p>
+                <a:pPr lvl="0"/>
+                <a:r>
+                  <a:rPr/>
+                  <a:t>Out-of-Bag error is calculated by checking the performance of each tree on a subset of unseen data during the training process.</a:t>
+                </a:r>
+                <a:br/>
+              </a:p>
+            </p:txBody>
+          </p:sp>
+        </mc:Choice>
+      </mc:AlternateContent>
+      <p:pic>
+        <p:nvPicPr>
+          <p:cNvPr descr="Presentation_files/figure-pptx/unnamed-chunk-1-1.png" id="0" name="Picture 1"/>
+          <p:cNvPicPr>
+            <a:picLocks noGrp="1" noChangeAspect="1"/>
+          </p:cNvPicPr>
+          <p:nvPr/>
+        </p:nvPicPr>
+        <p:blipFill>
+          <a:blip r:embed="rId2"/>
+          <a:stretch>
+            <a:fillRect/>
+          </a:stretch>
+        </p:blipFill>
+        <p:spPr bwMode="auto">
+          <a:xfrm>
+            <a:off x="4648200" y="1498600"/>
+            <a:ext cx="4038600" cy="2781300"/>
+          </a:xfrm>
+          <a:prstGeom prst="rect">
+            <a:avLst/>
+          </a:prstGeom>
+          <a:noFill/>
+          <a:ln w="9525">
+            <a:noFill/>
+            <a:headEnd/>
+            <a:tailEnd/>
+          </a:ln>
+        </p:spPr>
+      </p:pic>
     </p:spTree>
   </p:cSld>
 </p:sld>
@@ -3971,11 +4331,83 @@
             </a:pPr>
             <a:r>
               <a:rPr/>
-              <a:t>Random Forest</a:t>
-            </a:r>
-          </a:p>
-        </p:txBody>
-      </p:sp>
+              <a:t>Predictive Performance - Random Forests</a:t>
+            </a:r>
+          </a:p>
+        </p:txBody>
+      </p:sp>
+      <p:sp>
+        <p:nvSpPr>
+          <p:cNvPr id="3" name="Content Placeholder 2"/>
+          <p:cNvSpPr>
+            <a:spLocks noGrp="1"/>
+          </p:cNvSpPr>
+          <p:nvPr>
+            <p:ph idx="1" sz="half"/>
+          </p:nvPr>
+        </p:nvSpPr>
+        <p:spPr/>
+        <p:txBody>
+          <a:bodyPr/>
+          <a:lstStyle/>
+          <a:p>
+            <a:pPr lvl="0"/>
+            <a:r>
+              <a:rPr b="1"/>
+              <a:t>12.11</a:t>
+            </a:r>
+            <a:r>
+              <a:rPr/>
+              <a:t> OOB RMSE / </a:t>
+            </a:r>
+            <a:r>
+              <a:rPr b="1"/>
+              <a:t>12. 18</a:t>
+            </a:r>
+            <a:r>
+              <a:rPr/>
+              <a:t> Test RMSE. Similar RMSEs is good (generalizes well).</a:t>
+            </a:r>
+          </a:p>
+          <a:p>
+            <a:pPr lvl="0"/>
+            <a:r>
+              <a:rPr/>
+              <a:t>As sentencing length goes up, our models prediction becomes more variable. However, the models’ errors scale proportionally to sentencing length. Meaning we don’t typically get crazy predictions for lower sentencing lengths.</a:t>
+            </a:r>
+          </a:p>
+        </p:txBody>
+      </p:sp>
+      <p:pic>
+        <p:nvPicPr>
+          <p:cNvPr descr="Presentation_files/figure-pptx/unnamed-chunk-2-1.png" id="0" name="Picture 1"/>
+          <p:cNvPicPr>
+            <a:picLocks noGrp="1" noChangeAspect="1"/>
+          </p:cNvPicPr>
+          <p:nvPr/>
+        </p:nvPicPr>
+        <p:blipFill>
+          <a:blip r:embed="rId2"/>
+          <a:stretch>
+            <a:fillRect/>
+          </a:stretch>
+        </p:blipFill>
+        <p:spPr bwMode="auto">
+          <a:xfrm>
+            <a:off x="4648200" y="1498600"/>
+            <a:ext cx="4038600" cy="2781300"/>
+          </a:xfrm>
+          <a:prstGeom prst="rect">
+            <a:avLst/>
+          </a:prstGeom>
+          <a:noFill/>
+          <a:ln w="9525">
+            <a:noFill/>
+            <a:headEnd/>
+            <a:tailEnd/>
+          </a:ln>
+        </p:spPr>
+      </p:pic>
     </p:spTree>
   </p:cSld>
 </p:sld>
@@ -4018,7 +4450,7 @@
             </a:pPr>
             <a:r>
               <a:rPr/>
-              <a:t>Closing thoughts</a:t>
+              <a:t>Conclusion</a:t>
             </a:r>
           </a:p>
         </p:txBody>

</xml_diff>

<commit_message>
Added knn slides to main presentation
</commit_message>
<xml_diff>
--- a/Presentation/Presentation.pptx
+++ b/Presentation/Presentation.pptx
@@ -19,6 +19,12 @@
     <p:sldId id="267" r:id="rId13"/>
     <p:sldId id="268" r:id="rId14"/>
     <p:sldId id="269" r:id="rId15"/>
+    <p:sldId id="270" r:id="rId16"/>
+    <p:sldId id="271" r:id="rId17"/>
+    <p:sldId id="272" r:id="rId18"/>
+    <p:sldId id="273" r:id="rId19"/>
+    <p:sldId id="274" r:id="rId20"/>
+    <p:sldId id="275" r:id="rId21"/>
   </p:sldIdLst>
   <p:sldSz cx="9144000" cy="5143500" type="screen16x9"/>
   <p:notesSz cx="6858000" cy="9144000"/>
@@ -3207,7 +3213,7 @@
             </a:pPr>
             <a:r>
               <a:rPr/>
-              <a:t>Predictive Performance - Random Forests</a:t>
+              <a:t>KNN Model Analysis</a:t>
             </a:r>
           </a:p>
         </p:txBody>
@@ -3219,7 +3225,7 @@
             <a:spLocks noGrp="1"/>
           </p:cNvSpPr>
           <p:nvPr>
-            <p:ph idx="1" sz="half"/>
+            <p:ph idx="1"/>
           </p:nvPr>
         </p:nvSpPr>
         <p:spPr/>
@@ -3229,1006 +3235,53 @@
           <a:p>
             <a:pPr lvl="0"/>
             <a:r>
-              <a:rPr b="1"/>
-              <a:t>12.11</a:t>
-            </a:r>
-            <a:r>
               <a:rPr/>
-              <a:t> OOB RMSE / </a:t>
-            </a:r>
-            <a:r>
-              <a:rPr b="1"/>
-              <a:t>12. 18</a:t>
-            </a:r>
+              <a:t>Test error rate seems high on the surface (almost 40%)</a:t>
+            </a:r>
+          </a:p>
+          <a:p>
+            <a:pPr lvl="1"/>
             <a:r>
               <a:rPr/>
-              <a:t> Test RMSE. Similar RMSEs is good (generalizes well).</a:t>
+              <a:t>But we have to account for the fact that 17 categories are present</a:t>
+            </a:r>
+          </a:p>
+          <a:p>
+            <a:pPr lvl="2"/>
+            <a:r>
+              <a:rPr/>
+              <a:t>Expected guessing error w/ 17 prediction categories: ~94.12%</a:t>
             </a:r>
           </a:p>
           <a:p>
             <a:pPr lvl="0"/>
             <a:r>
               <a:rPr/>
-              <a:t>As sentencing length goes up, our models prediction becomes more variable. However, the models’ errors scale proportionally to sentencing length. Meaning we don’t typically get crazy predictions for lower sentencing lengths.</a:t>
-            </a:r>
-          </a:p>
-        </p:txBody>
-      </p:sp>
-      <p:pic>
-        <p:nvPicPr>
-          <p:cNvPr descr="Presentation_files/figure-pptx/unnamed-chunk-7-1.png" id="0" name="Picture 1"/>
-          <p:cNvPicPr>
-            <a:picLocks noGrp="1" noChangeAspect="1"/>
-          </p:cNvPicPr>
-          <p:nvPr/>
-        </p:nvPicPr>
-        <p:blipFill>
-          <a:blip r:embed="rId2"/>
-          <a:stretch>
-            <a:fillRect/>
-          </a:stretch>
-        </p:blipFill>
-        <p:spPr bwMode="auto">
-          <a:xfrm>
-            <a:off x="4648200" y="1498600"/>
-            <a:ext cx="4038600" cy="2781300"/>
-          </a:xfrm>
-          <a:prstGeom prst="rect">
-            <a:avLst/>
-          </a:prstGeom>
-          <a:noFill/>
-          <a:ln w="9525">
-            <a:noFill/>
-            <a:headEnd/>
-            <a:tailEnd/>
-          </a:ln>
-        </p:spPr>
-      </p:pic>
+              <a:t>Predictive accuracy was significantly better in categories with more observations (e.g., battery, illegal weapon use/possession, murder) than categories with few observations (e.g., vehicular hijacking/theft, forgery).</a:t>
+            </a:r>
+          </a:p>
+          <a:p>
+            <a:pPr lvl="1"/>
+            <a:r>
+              <a:rPr/>
+              <a:t>Only exceptions: drug manufacturing, theft (&lt; 45% accuracy).</a:t>
+            </a:r>
+          </a:p>
+          <a:p>
+            <a:pPr lvl="0"/>
+            <a:r>
+              <a:rPr/>
+              <a:t>Interpretation: more variability in predictor means for lower level offenses</a:t>
+            </a:r>
+          </a:p>
+        </p:txBody>
+      </p:sp>
     </p:spTree>
   </p:cSld>
 </p:sld>
 </file>
 
 <file path=ppt/slides/slide11.xml><?xml version="1.0" encoding="utf-8"?>
-<p:sld xmlns:a="http://schemas.openxmlformats.org/drawingml/2006/main" xmlns:r="http://schemas.openxmlformats.org/officeDocument/2006/relationships" xmlns:p="http://schemas.openxmlformats.org/presentationml/2006/main">
-  <p:cSld>
-    <p:spTree>
-      <p:nvGrpSpPr>
-        <p:cNvPr id="1" name=""/>
-        <p:cNvGrpSpPr/>
-        <p:nvPr/>
-      </p:nvGrpSpPr>
-      <p:grpSpPr>
-        <a:xfrm>
-          <a:off x="0" y="0"/>
-          <a:ext cx="0" cy="0"/>
-          <a:chOff x="0" y="0"/>
-          <a:chExt cx="0" cy="0"/>
-        </a:xfrm>
-      </p:grpSpPr>
-      <p:sp>
-        <p:nvSpPr>
-          <p:cNvPr id="2" name="Title 1"/>
-          <p:cNvSpPr>
-            <a:spLocks noGrp="1"/>
-          </p:cNvSpPr>
-          <p:nvPr>
-            <p:ph type="title"/>
-          </p:nvPr>
-        </p:nvSpPr>
-        <p:spPr/>
-        <p:txBody>
-          <a:bodyPr/>
-          <a:lstStyle/>
-          <a:p>
-            <a:pPr lvl="0" indent="0" marL="0">
-              <a:buNone/>
-            </a:pPr>
-            <a:r>
-              <a:rPr/>
-              <a:t>Conclusion</a:t>
-            </a:r>
-          </a:p>
-        </p:txBody>
-      </p:sp>
-    </p:spTree>
-  </p:cSld>
-</p:sld>
-</file>
-
-<file path=ppt/slides/slide12.xml><?xml version="1.0" encoding="utf-8"?>
-<p:sld xmlns:a="http://schemas.openxmlformats.org/drawingml/2006/main" xmlns:r="http://schemas.openxmlformats.org/officeDocument/2006/relationships" xmlns:p="http://schemas.openxmlformats.org/presentationml/2006/main">
-  <p:cSld>
-    <p:spTree>
-      <p:nvGrpSpPr>
-        <p:cNvPr id="1" name=""/>
-        <p:cNvGrpSpPr/>
-        <p:nvPr/>
-      </p:nvGrpSpPr>
-      <p:grpSpPr>
-        <a:xfrm>
-          <a:off x="0" y="0"/>
-          <a:ext cx="0" cy="0"/>
-          <a:chOff x="0" y="0"/>
-          <a:chExt cx="0" cy="0"/>
-        </a:xfrm>
-      </p:grpSpPr>
-      <p:sp>
-        <p:nvSpPr>
-          <p:cNvPr id="2" name="Title 1"/>
-          <p:cNvSpPr>
-            <a:spLocks noGrp="1"/>
-          </p:cNvSpPr>
-          <p:nvPr>
-            <p:ph type="title"/>
-          </p:nvPr>
-        </p:nvSpPr>
-        <p:spPr/>
-        <p:txBody>
-          <a:bodyPr/>
-          <a:lstStyle/>
-          <a:p>
-            <a:pPr lvl="0" indent="0" marL="0">
-              <a:buNone/>
-            </a:pPr>
-            <a:r>
-              <a:rPr/>
-              <a:t>References</a:t>
-            </a:r>
-          </a:p>
-        </p:txBody>
-      </p:sp>
-      <p:sp>
-        <p:nvSpPr>
-          <p:cNvPr id="3" name="Content Placeholder 2"/>
-          <p:cNvSpPr>
-            <a:spLocks noGrp="1"/>
-          </p:cNvSpPr>
-          <p:nvPr>
-            <p:ph idx="1"/>
-          </p:nvPr>
-        </p:nvSpPr>
-        <p:spPr/>
-        <p:txBody>
-          <a:bodyPr/>
-          <a:lstStyle/>
-          <a:p>
-            <a:pPr lvl="0" indent="0" marL="0">
-              <a:buNone/>
-            </a:pPr>
-            <a:r>
-              <a:rPr/>
-              <a:t>-https://www.kaggle.com/datasets/davidjfisher/illinois-doc-labeled-faces-dataset -https://www.idoc.state.il.us</a:t>
-            </a:r>
-          </a:p>
-        </p:txBody>
-      </p:sp>
-    </p:spTree>
-  </p:cSld>
-</p:sld>
-</file>
-
-<file path=ppt/slides/slide13.xml><?xml version="1.0" encoding="utf-8"?>
-<p:sld xmlns:a="http://schemas.openxmlformats.org/drawingml/2006/main" xmlns:r="http://schemas.openxmlformats.org/officeDocument/2006/relationships" xmlns:p="http://schemas.openxmlformats.org/presentationml/2006/main">
-  <p:cSld>
-    <p:spTree>
-      <p:nvGrpSpPr>
-        <p:cNvPr id="1" name=""/>
-        <p:cNvGrpSpPr/>
-        <p:nvPr/>
-      </p:nvGrpSpPr>
-      <p:grpSpPr>
-        <a:xfrm>
-          <a:off x="0" y="0"/>
-          <a:ext cx="0" cy="0"/>
-          <a:chOff x="0" y="0"/>
-          <a:chExt cx="0" cy="0"/>
-        </a:xfrm>
-      </p:grpSpPr>
-      <p:sp>
-        <p:nvSpPr>
-          <p:cNvPr id="2" name="Title 1"/>
-          <p:cNvSpPr>
-            <a:spLocks noGrp="1"/>
-          </p:cNvSpPr>
-          <p:nvPr>
-            <p:ph type="title"/>
-          </p:nvPr>
-        </p:nvSpPr>
-        <p:spPr/>
-        <p:txBody>
-          <a:bodyPr/>
-          <a:lstStyle/>
-          <a:p>
-            <a:pPr lvl="0" indent="0" marL="0">
-              <a:buNone/>
-            </a:pPr>
-            <a:r>
-              <a:rPr/>
-              <a:t>Questions?</a:t>
-            </a:r>
-          </a:p>
-        </p:txBody>
-      </p:sp>
-    </p:spTree>
-  </p:cSld>
-</p:sld>
-</file>
-
-<file path=ppt/slides/slide14.xml><?xml version="1.0" encoding="utf-8"?>
-<p:sld xmlns:a="http://schemas.openxmlformats.org/drawingml/2006/main" xmlns:r="http://schemas.openxmlformats.org/officeDocument/2006/relationships" xmlns:p="http://schemas.openxmlformats.org/presentationml/2006/main">
-  <p:cSld>
-    <p:spTree>
-      <p:nvGrpSpPr>
-        <p:cNvPr id="1" name=""/>
-        <p:cNvGrpSpPr/>
-        <p:nvPr/>
-      </p:nvGrpSpPr>
-      <p:grpSpPr>
-        <a:xfrm>
-          <a:off x="0" y="0"/>
-          <a:ext cx="0" cy="0"/>
-          <a:chOff x="0" y="0"/>
-          <a:chExt cx="0" cy="0"/>
-        </a:xfrm>
-      </p:grpSpPr>
-      <p:sp>
-        <p:nvSpPr>
-          <p:cNvPr id="2" name="Title 1"/>
-          <p:cNvSpPr>
-            <a:spLocks noGrp="1"/>
-          </p:cNvSpPr>
-          <p:nvPr>
-            <p:ph type="title"/>
-          </p:nvPr>
-        </p:nvSpPr>
-        <p:spPr/>
-        <p:txBody>
-          <a:bodyPr/>
-          <a:lstStyle/>
-          <a:p>
-            <a:pPr lvl="0" indent="0" marL="0">
-              <a:buNone/>
-            </a:pPr>
-            <a:r>
-              <a:rPr/>
-              <a:t>Bonus Slides - Complete Variable Importance for RF</a:t>
-            </a:r>
-          </a:p>
-        </p:txBody>
-      </p:sp>
-      <p:pic>
-        <p:nvPicPr>
-          <p:cNvPr descr="Presentation_files/figure-pptx/unnamed-chunk-8-1.png" id="0" name="Picture 1"/>
-          <p:cNvPicPr>
-            <a:picLocks noGrp="1" noChangeAspect="1"/>
-          </p:cNvPicPr>
-          <p:nvPr/>
-        </p:nvPicPr>
-        <p:blipFill>
-          <a:blip r:embed="rId2"/>
-          <a:stretch>
-            <a:fillRect/>
-          </a:stretch>
-        </p:blipFill>
-        <p:spPr bwMode="auto">
-          <a:xfrm>
-            <a:off x="2108200" y="1193800"/>
-            <a:ext cx="4927600" cy="3390900"/>
-          </a:xfrm>
-          <a:prstGeom prst="rect">
-            <a:avLst/>
-          </a:prstGeom>
-          <a:noFill/>
-          <a:ln w="9525">
-            <a:noFill/>
-            <a:headEnd/>
-            <a:tailEnd/>
-          </a:ln>
-        </p:spPr>
-      </p:pic>
-    </p:spTree>
-  </p:cSld>
-</p:sld>
-</file>
-
-<file path=ppt/slides/slide2.xml><?xml version="1.0" encoding="utf-8"?>
-<p:sld xmlns:a="http://schemas.openxmlformats.org/drawingml/2006/main" xmlns:r="http://schemas.openxmlformats.org/officeDocument/2006/relationships" xmlns:p="http://schemas.openxmlformats.org/presentationml/2006/main">
-  <p:cSld>
-    <p:spTree>
-      <p:nvGrpSpPr>
-        <p:cNvPr id="1" name=""/>
-        <p:cNvGrpSpPr/>
-        <p:nvPr/>
-      </p:nvGrpSpPr>
-      <p:grpSpPr>
-        <a:xfrm>
-          <a:off x="0" y="0"/>
-          <a:ext cx="0" cy="0"/>
-          <a:chOff x="0" y="0"/>
-          <a:chExt cx="0" cy="0"/>
-        </a:xfrm>
-      </p:grpSpPr>
-      <p:sp>
-        <p:nvSpPr>
-          <p:cNvPr id="2" name="Title 1"/>
-          <p:cNvSpPr>
-            <a:spLocks noGrp="1"/>
-          </p:cNvSpPr>
-          <p:nvPr>
-            <p:ph type="title"/>
-          </p:nvPr>
-        </p:nvSpPr>
-        <p:spPr/>
-        <p:txBody>
-          <a:bodyPr/>
-          <a:lstStyle/>
-          <a:p>
-            <a:pPr lvl="0" indent="0" marL="0">
-              <a:buNone/>
-            </a:pPr>
-            <a:r>
-              <a:rPr/>
-              <a:t>Dataset and Preparation</a:t>
-            </a:r>
-          </a:p>
-        </p:txBody>
-      </p:sp>
-      <p:sp>
-        <p:nvSpPr>
-          <p:cNvPr id="3" name="Content Placeholder 2"/>
-          <p:cNvSpPr>
-            <a:spLocks noGrp="1"/>
-          </p:cNvSpPr>
-          <p:nvPr>
-            <p:ph idx="1"/>
-          </p:nvPr>
-        </p:nvSpPr>
-        <p:spPr/>
-        <p:txBody>
-          <a:bodyPr/>
-          <a:lstStyle/>
-          <a:p>
-            <a:pPr lvl="0" indent="0" marL="0">
-              <a:buNone/>
-            </a:pPr>
-            <a:r>
-              <a:rPr/>
-              <a:t>Our data comes from Kaggle, it consists of 3 CSV files with data scraped off the Illinois Department Of Corrections website.</a:t>
-            </a:r>
-          </a:p>
-          <a:p>
-            <a:pPr lvl="0"/>
-            <a:r>
-              <a:rPr/>
-              <a:t>Contains information 61,052 individuals who have been incarcerated in Illinois from 1952-2018.</a:t>
-            </a:r>
-          </a:p>
-          <a:p>
-            <a:pPr lvl="0"/>
-            <a:r>
-              <a:rPr/>
-              <a:t>“Person” dataset includes simple descriptive information on the person: Name, DOB, Sentencing Date, Race, Eye Color, Hair Color, etc…</a:t>
-            </a:r>
-          </a:p>
-          <a:p>
-            <a:pPr lvl="0"/>
-            <a:r>
-              <a:rPr/>
-              <a:t>“Marks” has multiple rows per person listing any additional descriptive features like scars and tattoos.</a:t>
-            </a:r>
-          </a:p>
-          <a:p>
-            <a:pPr lvl="0"/>
-            <a:r>
-              <a:rPr/>
-              <a:t>“Sentencing” is information on the charges faced by the individual, the crime categorized by Illinois’ felony classes, and our response variable, sentencing time.</a:t>
-            </a:r>
-          </a:p>
-        </p:txBody>
-      </p:sp>
-    </p:spTree>
-  </p:cSld>
-  <p:timing>
-    <p:tnLst>
-      <p:par>
-        <p:cTn id="1" dur="indefinite" restart="never" nodeType="tmRoot">
-          <p:childTnLst>
-            <p:seq concurrent="1" nextAc="seek">
-              <p:cTn id="2" dur="indefinite" nodeType="mainSeq">
-                <p:childTnLst>
-                  <p:par>
-                    <p:cTn id="3" fill="hold">
-                      <p:stCondLst>
-                        <p:cond delay="indefinite"/>
-                      </p:stCondLst>
-                      <p:childTnLst>
-                        <p:par>
-                          <p:cTn id="4" fill="hold">
-                            <p:stCondLst>
-                              <p:cond delay="0"/>
-                            </p:stCondLst>
-                            <p:childTnLst>
-                              <p:par>
-                                <p:cTn id="5" presetID="1" presetClass="entr" presetSubtype="0" fill="hold" grpId="0" nodeType="clickEffect">
-                                  <p:stCondLst>
-                                    <p:cond delay="0"/>
-                                  </p:stCondLst>
-                                  <p:childTnLst>
-                                    <p:set>
-                                      <p:cBhvr>
-                                        <p:cTn id="6" dur="1" fill="hold">
-                                          <p:stCondLst>
-                                            <p:cond delay="0"/>
-                                          </p:stCondLst>
-                                        </p:cTn>
-                                        <p:tgtEl>
-                                          <p:spTgt spid="3">
-                                            <p:txEl>
-                                              <p:pRg st="1" end="1"/>
-                                            </p:txEl>
-                                          </p:spTgt>
-                                        </p:tgtEl>
-                                        <p:attrNameLst>
-                                          <p:attrName>style.visibility</p:attrName>
-                                        </p:attrNameLst>
-                                      </p:cBhvr>
-                                      <p:to>
-                                        <p:strVal val="visible"/>
-                                      </p:to>
-                                    </p:set>
-                                  </p:childTnLst>
-                                </p:cTn>
-                              </p:par>
-                            </p:childTnLst>
-                          </p:cTn>
-                        </p:par>
-                      </p:childTnLst>
-                    </p:cTn>
-                  </p:par>
-                  <p:par>
-                    <p:cTn id="7" fill="hold">
-                      <p:stCondLst>
-                        <p:cond delay="indefinite"/>
-                      </p:stCondLst>
-                      <p:childTnLst>
-                        <p:par>
-                          <p:cTn id="8" fill="hold">
-                            <p:stCondLst>
-                              <p:cond delay="0"/>
-                            </p:stCondLst>
-                            <p:childTnLst>
-                              <p:par>
-                                <p:cTn id="9" presetID="1" presetClass="entr" presetSubtype="0" fill="hold" grpId="0" nodeType="clickEffect">
-                                  <p:stCondLst>
-                                    <p:cond delay="0"/>
-                                  </p:stCondLst>
-                                  <p:childTnLst>
-                                    <p:set>
-                                      <p:cBhvr>
-                                        <p:cTn id="10" dur="1" fill="hold">
-                                          <p:stCondLst>
-                                            <p:cond delay="0"/>
-                                          </p:stCondLst>
-                                        </p:cTn>
-                                        <p:tgtEl>
-                                          <p:spTgt spid="3">
-                                            <p:txEl>
-                                              <p:pRg st="2" end="2"/>
-                                            </p:txEl>
-                                          </p:spTgt>
-                                        </p:tgtEl>
-                                        <p:attrNameLst>
-                                          <p:attrName>style.visibility</p:attrName>
-                                        </p:attrNameLst>
-                                      </p:cBhvr>
-                                      <p:to>
-                                        <p:strVal val="visible"/>
-                                      </p:to>
-                                    </p:set>
-                                  </p:childTnLst>
-                                </p:cTn>
-                              </p:par>
-                            </p:childTnLst>
-                          </p:cTn>
-                        </p:par>
-                      </p:childTnLst>
-                    </p:cTn>
-                  </p:par>
-                  <p:par>
-                    <p:cTn id="11" fill="hold">
-                      <p:stCondLst>
-                        <p:cond delay="indefinite"/>
-                      </p:stCondLst>
-                      <p:childTnLst>
-                        <p:par>
-                          <p:cTn id="12" fill="hold">
-                            <p:stCondLst>
-                              <p:cond delay="0"/>
-                            </p:stCondLst>
-                            <p:childTnLst>
-                              <p:par>
-                                <p:cTn id="13" presetID="1" presetClass="entr" presetSubtype="0" fill="hold" grpId="0" nodeType="clickEffect">
-                                  <p:stCondLst>
-                                    <p:cond delay="0"/>
-                                  </p:stCondLst>
-                                  <p:childTnLst>
-                                    <p:set>
-                                      <p:cBhvr>
-                                        <p:cTn id="14" dur="1" fill="hold">
-                                          <p:stCondLst>
-                                            <p:cond delay="0"/>
-                                          </p:stCondLst>
-                                        </p:cTn>
-                                        <p:tgtEl>
-                                          <p:spTgt spid="3">
-                                            <p:txEl>
-                                              <p:pRg st="3" end="3"/>
-                                            </p:txEl>
-                                          </p:spTgt>
-                                        </p:tgtEl>
-                                        <p:attrNameLst>
-                                          <p:attrName>style.visibility</p:attrName>
-                                        </p:attrNameLst>
-                                      </p:cBhvr>
-                                      <p:to>
-                                        <p:strVal val="visible"/>
-                                      </p:to>
-                                    </p:set>
-                                  </p:childTnLst>
-                                </p:cTn>
-                              </p:par>
-                            </p:childTnLst>
-                          </p:cTn>
-                        </p:par>
-                      </p:childTnLst>
-                    </p:cTn>
-                  </p:par>
-                  <p:par>
-                    <p:cTn id="15" fill="hold">
-                      <p:stCondLst>
-                        <p:cond delay="indefinite"/>
-                      </p:stCondLst>
-                      <p:childTnLst>
-                        <p:par>
-                          <p:cTn id="16" fill="hold">
-                            <p:stCondLst>
-                              <p:cond delay="0"/>
-                            </p:stCondLst>
-                            <p:childTnLst>
-                              <p:par>
-                                <p:cTn id="17" presetID="1" presetClass="entr" presetSubtype="0" fill="hold" grpId="0" nodeType="clickEffect">
-                                  <p:stCondLst>
-                                    <p:cond delay="0"/>
-                                  </p:stCondLst>
-                                  <p:childTnLst>
-                                    <p:set>
-                                      <p:cBhvr>
-                                        <p:cTn id="18" dur="1" fill="hold">
-                                          <p:stCondLst>
-                                            <p:cond delay="0"/>
-                                          </p:stCondLst>
-                                        </p:cTn>
-                                        <p:tgtEl>
-                                          <p:spTgt spid="3">
-                                            <p:txEl>
-                                              <p:pRg st="4" end="4"/>
-                                            </p:txEl>
-                                          </p:spTgt>
-                                        </p:tgtEl>
-                                        <p:attrNameLst>
-                                          <p:attrName>style.visibility</p:attrName>
-                                        </p:attrNameLst>
-                                      </p:cBhvr>
-                                      <p:to>
-                                        <p:strVal val="visible"/>
-                                      </p:to>
-                                    </p:set>
-                                  </p:childTnLst>
-                                </p:cTn>
-                              </p:par>
-                            </p:childTnLst>
-                          </p:cTn>
-                        </p:par>
-                      </p:childTnLst>
-                    </p:cTn>
-                  </p:par>
-                </p:childTnLst>
-              </p:cTn>
-              <p:prevCondLst>
-                <p:cond evt="onPrev" delay="0">
-                  <p:tgtEl>
-                    <p:sldTgt/>
-                  </p:tgtEl>
-                </p:cond>
-              </p:prevCondLst>
-              <p:nextCondLst>
-                <p:cond evt="onNext" delay="0">
-                  <p:tgtEl>
-                    <p:sldTgt/>
-                  </p:tgtEl>
-                </p:cond>
-              </p:nextCondLst>
-            </p:seq>
-          </p:childTnLst>
-        </p:cTn>
-      </p:par>
-    </p:tnLst>
-    <p:bldLst>
-      <p:bldP spid="3" grpId="0" uiExpand="1" build="p"/>
-    </p:bldLst>
-  </p:timing>
-</p:sld>
-</file>
-
-<file path=ppt/slides/slide3.xml><?xml version="1.0" encoding="utf-8"?>
-<p:sld xmlns:a="http://schemas.openxmlformats.org/drawingml/2006/main" xmlns:r="http://schemas.openxmlformats.org/officeDocument/2006/relationships" xmlns:p="http://schemas.openxmlformats.org/presentationml/2006/main">
-  <p:cSld>
-    <p:spTree>
-      <p:nvGrpSpPr>
-        <p:cNvPr id="1" name=""/>
-        <p:cNvGrpSpPr/>
-        <p:nvPr/>
-      </p:nvGrpSpPr>
-      <p:grpSpPr>
-        <a:xfrm>
-          <a:off x="0" y="0"/>
-          <a:ext cx="0" cy="0"/>
-          <a:chOff x="0" y="0"/>
-          <a:chExt cx="0" cy="0"/>
-        </a:xfrm>
-      </p:grpSpPr>
-      <p:sp>
-        <p:nvSpPr>
-          <p:cNvPr id="2" name="Title 1"/>
-          <p:cNvSpPr>
-            <a:spLocks noGrp="1"/>
-          </p:cNvSpPr>
-          <p:nvPr>
-            <p:ph type="title"/>
-          </p:nvPr>
-        </p:nvSpPr>
-        <p:spPr/>
-        <p:txBody>
-          <a:bodyPr/>
-          <a:lstStyle/>
-          <a:p>
-            <a:pPr lvl="0" indent="0" marL="0">
-              <a:buNone/>
-            </a:pPr>
-            <a:r>
-              <a:rPr/>
-              <a:t>Research Questions</a:t>
-            </a:r>
-          </a:p>
-        </p:txBody>
-      </p:sp>
-      <p:sp>
-        <p:nvSpPr>
-          <p:cNvPr id="3" name="Content Placeholder 2"/>
-          <p:cNvSpPr>
-            <a:spLocks noGrp="1"/>
-          </p:cNvSpPr>
-          <p:nvPr>
-            <p:ph idx="1"/>
-          </p:nvPr>
-        </p:nvSpPr>
-        <p:spPr/>
-        <p:txBody>
-          <a:bodyPr/>
-          <a:lstStyle/>
-          <a:p>
-            <a:pPr lvl="0"/>
-            <a:r>
-              <a:rPr/>
-              <a:t>What predictors have the strongest effect on sentencing length?</a:t>
-            </a:r>
-          </a:p>
-          <a:p>
-            <a:pPr lvl="0"/>
-            <a:r>
-              <a:rPr/>
-              <a:t>How accurately can we predict sentencing length?</a:t>
-            </a:r>
-          </a:p>
-          <a:p>
-            <a:pPr lvl="0"/>
-            <a:r>
-              <a:rPr/>
-              <a:t>What predictors have the strongest effect on offence category?</a:t>
-            </a:r>
-          </a:p>
-          <a:p>
-            <a:pPr lvl="0"/>
-            <a:r>
-              <a:rPr/>
-              <a:t>How accurately can we predict offence categories?</a:t>
-            </a:r>
-          </a:p>
-        </p:txBody>
-      </p:sp>
-    </p:spTree>
-  </p:cSld>
-  <p:timing>
-    <p:tnLst>
-      <p:par>
-        <p:cTn id="1" dur="indefinite" restart="never" nodeType="tmRoot">
-          <p:childTnLst>
-            <p:seq concurrent="1" nextAc="seek">
-              <p:cTn id="2" dur="indefinite" nodeType="mainSeq">
-                <p:childTnLst>
-                  <p:par>
-                    <p:cTn id="3" fill="hold">
-                      <p:stCondLst>
-                        <p:cond delay="indefinite"/>
-                      </p:stCondLst>
-                      <p:childTnLst>
-                        <p:par>
-                          <p:cTn id="4" fill="hold">
-                            <p:stCondLst>
-                              <p:cond delay="0"/>
-                            </p:stCondLst>
-                            <p:childTnLst>
-                              <p:par>
-                                <p:cTn id="5" presetID="1" presetClass="entr" presetSubtype="0" fill="hold" grpId="0" nodeType="clickEffect">
-                                  <p:stCondLst>
-                                    <p:cond delay="0"/>
-                                  </p:stCondLst>
-                                  <p:childTnLst>
-                                    <p:set>
-                                      <p:cBhvr>
-                                        <p:cTn id="6" dur="1" fill="hold">
-                                          <p:stCondLst>
-                                            <p:cond delay="0"/>
-                                          </p:stCondLst>
-                                        </p:cTn>
-                                        <p:tgtEl>
-                                          <p:spTgt spid="3">
-                                            <p:txEl>
-                                              <p:pRg st="0" end="0"/>
-                                            </p:txEl>
-                                          </p:spTgt>
-                                        </p:tgtEl>
-                                        <p:attrNameLst>
-                                          <p:attrName>style.visibility</p:attrName>
-                                        </p:attrNameLst>
-                                      </p:cBhvr>
-                                      <p:to>
-                                        <p:strVal val="visible"/>
-                                      </p:to>
-                                    </p:set>
-                                  </p:childTnLst>
-                                </p:cTn>
-                              </p:par>
-                            </p:childTnLst>
-                          </p:cTn>
-                        </p:par>
-                      </p:childTnLst>
-                    </p:cTn>
-                  </p:par>
-                  <p:par>
-                    <p:cTn id="7" fill="hold">
-                      <p:stCondLst>
-                        <p:cond delay="indefinite"/>
-                      </p:stCondLst>
-                      <p:childTnLst>
-                        <p:par>
-                          <p:cTn id="8" fill="hold">
-                            <p:stCondLst>
-                              <p:cond delay="0"/>
-                            </p:stCondLst>
-                            <p:childTnLst>
-                              <p:par>
-                                <p:cTn id="9" presetID="1" presetClass="entr" presetSubtype="0" fill="hold" grpId="0" nodeType="clickEffect">
-                                  <p:stCondLst>
-                                    <p:cond delay="0"/>
-                                  </p:stCondLst>
-                                  <p:childTnLst>
-                                    <p:set>
-                                      <p:cBhvr>
-                                        <p:cTn id="10" dur="1" fill="hold">
-                                          <p:stCondLst>
-                                            <p:cond delay="0"/>
-                                          </p:stCondLst>
-                                        </p:cTn>
-                                        <p:tgtEl>
-                                          <p:spTgt spid="3">
-                                            <p:txEl>
-                                              <p:pRg st="1" end="1"/>
-                                            </p:txEl>
-                                          </p:spTgt>
-                                        </p:tgtEl>
-                                        <p:attrNameLst>
-                                          <p:attrName>style.visibility</p:attrName>
-                                        </p:attrNameLst>
-                                      </p:cBhvr>
-                                      <p:to>
-                                        <p:strVal val="visible"/>
-                                      </p:to>
-                                    </p:set>
-                                  </p:childTnLst>
-                                </p:cTn>
-                              </p:par>
-                            </p:childTnLst>
-                          </p:cTn>
-                        </p:par>
-                      </p:childTnLst>
-                    </p:cTn>
-                  </p:par>
-                  <p:par>
-                    <p:cTn id="11" fill="hold">
-                      <p:stCondLst>
-                        <p:cond delay="indefinite"/>
-                      </p:stCondLst>
-                      <p:childTnLst>
-                        <p:par>
-                          <p:cTn id="12" fill="hold">
-                            <p:stCondLst>
-                              <p:cond delay="0"/>
-                            </p:stCondLst>
-                            <p:childTnLst>
-                              <p:par>
-                                <p:cTn id="13" presetID="1" presetClass="entr" presetSubtype="0" fill="hold" grpId="0" nodeType="clickEffect">
-                                  <p:stCondLst>
-                                    <p:cond delay="0"/>
-                                  </p:stCondLst>
-                                  <p:childTnLst>
-                                    <p:set>
-                                      <p:cBhvr>
-                                        <p:cTn id="14" dur="1" fill="hold">
-                                          <p:stCondLst>
-                                            <p:cond delay="0"/>
-                                          </p:stCondLst>
-                                        </p:cTn>
-                                        <p:tgtEl>
-                                          <p:spTgt spid="3">
-                                            <p:txEl>
-                                              <p:pRg st="2" end="2"/>
-                                            </p:txEl>
-                                          </p:spTgt>
-                                        </p:tgtEl>
-                                        <p:attrNameLst>
-                                          <p:attrName>style.visibility</p:attrName>
-                                        </p:attrNameLst>
-                                      </p:cBhvr>
-                                      <p:to>
-                                        <p:strVal val="visible"/>
-                                      </p:to>
-                                    </p:set>
-                                  </p:childTnLst>
-                                </p:cTn>
-                              </p:par>
-                            </p:childTnLst>
-                          </p:cTn>
-                        </p:par>
-                      </p:childTnLst>
-                    </p:cTn>
-                  </p:par>
-                  <p:par>
-                    <p:cTn id="15" fill="hold">
-                      <p:stCondLst>
-                        <p:cond delay="indefinite"/>
-                      </p:stCondLst>
-                      <p:childTnLst>
-                        <p:par>
-                          <p:cTn id="16" fill="hold">
-                            <p:stCondLst>
-                              <p:cond delay="0"/>
-                            </p:stCondLst>
-                            <p:childTnLst>
-                              <p:par>
-                                <p:cTn id="17" presetID="1" presetClass="entr" presetSubtype="0" fill="hold" grpId="0" nodeType="clickEffect">
-                                  <p:stCondLst>
-                                    <p:cond delay="0"/>
-                                  </p:stCondLst>
-                                  <p:childTnLst>
-                                    <p:set>
-                                      <p:cBhvr>
-                                        <p:cTn id="18" dur="1" fill="hold">
-                                          <p:stCondLst>
-                                            <p:cond delay="0"/>
-                                          </p:stCondLst>
-                                        </p:cTn>
-                                        <p:tgtEl>
-                                          <p:spTgt spid="3">
-                                            <p:txEl>
-                                              <p:pRg st="3" end="3"/>
-                                            </p:txEl>
-                                          </p:spTgt>
-                                        </p:tgtEl>
-                                        <p:attrNameLst>
-                                          <p:attrName>style.visibility</p:attrName>
-                                        </p:attrNameLst>
-                                      </p:cBhvr>
-                                      <p:to>
-                                        <p:strVal val="visible"/>
-                                      </p:to>
-                                    </p:set>
-                                  </p:childTnLst>
-                                </p:cTn>
-                              </p:par>
-                            </p:childTnLst>
-                          </p:cTn>
-                        </p:par>
-                      </p:childTnLst>
-                    </p:cTn>
-                  </p:par>
-                </p:childTnLst>
-              </p:cTn>
-              <p:prevCondLst>
-                <p:cond evt="onPrev" delay="0">
-                  <p:tgtEl>
-                    <p:sldTgt/>
-                  </p:tgtEl>
-                </p:cond>
-              </p:prevCondLst>
-              <p:nextCondLst>
-                <p:cond evt="onNext" delay="0">
-                  <p:tgtEl>
-                    <p:sldTgt/>
-                  </p:tgtEl>
-                </p:cond>
-              </p:nextCondLst>
-            </p:seq>
-          </p:childTnLst>
-        </p:cTn>
-      </p:par>
-    </p:tnLst>
-    <p:bldLst>
-      <p:bldP spid="3" grpId="0" uiExpand="1" build="p"/>
-    </p:bldLst>
-  </p:timing>
-</p:sld>
-</file>
-
-<file path=ppt/slides/slide4.xml><?xml version="1.0" encoding="utf-8"?>
-<p:sld xmlns:a="http://schemas.openxmlformats.org/drawingml/2006/main" xmlns:r="http://schemas.openxmlformats.org/officeDocument/2006/relationships" xmlns:p="http://schemas.openxmlformats.org/presentationml/2006/main">
-  <p:cSld>
-    <p:spTree>
-      <p:nvGrpSpPr>
-        <p:cNvPr id="1" name=""/>
-        <p:cNvGrpSpPr/>
-        <p:nvPr/>
-      </p:nvGrpSpPr>
-      <p:grpSpPr>
-        <a:xfrm>
-          <a:off x="0" y="0"/>
-          <a:ext cx="0" cy="0"/>
-          <a:chOff x="0" y="0"/>
-          <a:chExt cx="0" cy="0"/>
-        </a:xfrm>
-      </p:grpSpPr>
-      <p:sp>
-        <p:nvSpPr>
-          <p:cNvPr id="2" name="Title 1"/>
-          <p:cNvSpPr>
-            <a:spLocks noGrp="1"/>
-          </p:cNvSpPr>
-          <p:nvPr>
-            <p:ph type="title"/>
-          </p:nvPr>
-        </p:nvSpPr>
-        <p:spPr/>
-        <p:txBody>
-          <a:bodyPr/>
-          <a:lstStyle/>
-          <a:p>
-            <a:pPr lvl="0" indent="0" marL="0">
-              <a:buNone/>
-            </a:pPr>
-            <a:r>
-              <a:rPr/>
-              <a:t>KNN</a:t>
-            </a:r>
-          </a:p>
-        </p:txBody>
-      </p:sp>
-    </p:spTree>
-  </p:cSld>
-</p:sld>
-</file>
-
-<file path=ppt/slides/slide5.xml><?xml version="1.0" encoding="utf-8"?>
 <p:sld xmlns:a="http://schemas.openxmlformats.org/drawingml/2006/main" xmlns:r="http://schemas.openxmlformats.org/officeDocument/2006/relationships" xmlns:p="http://schemas.openxmlformats.org/presentationml/2006/main">
   <p:cSld>
     <p:spTree>
@@ -4625,7 +3678,7 @@
 </p:sld>
 </file>
 
-<file path=ppt/slides/slide6.xml><?xml version="1.0" encoding="utf-8"?>
+<file path=ppt/slides/slide12.xml><?xml version="1.0" encoding="utf-8"?>
 <p:sld xmlns:a="http://schemas.openxmlformats.org/drawingml/2006/main" xmlns:r="http://schemas.openxmlformats.org/officeDocument/2006/relationships" xmlns:p="http://schemas.openxmlformats.org/presentationml/2006/main">
   <p:cSld>
     <p:spTree>
@@ -5294,7 +4347,7 @@
 </p:sld>
 </file>
 
-<file path=ppt/slides/slide7.xml><?xml version="1.0" encoding="utf-8"?>
+<file path=ppt/slides/slide13.xml><?xml version="1.0" encoding="utf-8"?>
 <p:sld xmlns:a="http://schemas.openxmlformats.org/drawingml/2006/main" xmlns:r="http://schemas.openxmlformats.org/officeDocument/2006/relationships" xmlns:p="http://schemas.openxmlformats.org/presentationml/2006/main">
   <p:cSld>
     <p:spTree>
@@ -5853,7 +4906,7 @@
 </p:sld>
 </file>
 
-<file path=ppt/slides/slide8.xml><?xml version="1.0" encoding="utf-8"?>
+<file path=ppt/slides/slide14.xml><?xml version="1.0" encoding="utf-8"?>
 <p:sld xmlns:a="http://schemas.openxmlformats.org/drawingml/2006/main" xmlns:r="http://schemas.openxmlformats.org/officeDocument/2006/relationships" xmlns:p="http://schemas.openxmlformats.org/presentationml/2006/main">
   <p:cSld>
     <p:spTree>
@@ -5930,7 +4983,7 @@
 </p:sld>
 </file>
 
-<file path=ppt/slides/slide9.xml><?xml version="1.0" encoding="utf-8"?>
+<file path=ppt/slides/slide15.xml><?xml version="1.0" encoding="utf-8"?>
 <p:sld xmlns:a="http://schemas.openxmlformats.org/drawingml/2006/main" xmlns:r="http://schemas.openxmlformats.org/officeDocument/2006/relationships" xmlns:p="http://schemas.openxmlformats.org/presentationml/2006/main">
   <p:cSld>
     <p:spTree>
@@ -6065,6 +5118,2729 @@
           </a:ln>
         </p:spPr>
       </p:pic>
+    </p:spTree>
+  </p:cSld>
+</p:sld>
+</file>
+
+<file path=ppt/slides/slide16.xml><?xml version="1.0" encoding="utf-8"?>
+<p:sld xmlns:a="http://schemas.openxmlformats.org/drawingml/2006/main" xmlns:r="http://schemas.openxmlformats.org/officeDocument/2006/relationships" xmlns:p="http://schemas.openxmlformats.org/presentationml/2006/main">
+  <p:cSld>
+    <p:spTree>
+      <p:nvGrpSpPr>
+        <p:cNvPr id="1" name=""/>
+        <p:cNvGrpSpPr/>
+        <p:nvPr/>
+      </p:nvGrpSpPr>
+      <p:grpSpPr>
+        <a:xfrm>
+          <a:off x="0" y="0"/>
+          <a:ext cx="0" cy="0"/>
+          <a:chOff x="0" y="0"/>
+          <a:chExt cx="0" cy="0"/>
+        </a:xfrm>
+      </p:grpSpPr>
+      <p:sp>
+        <p:nvSpPr>
+          <p:cNvPr id="2" name="Title 1"/>
+          <p:cNvSpPr>
+            <a:spLocks noGrp="1"/>
+          </p:cNvSpPr>
+          <p:nvPr>
+            <p:ph type="title"/>
+          </p:nvPr>
+        </p:nvSpPr>
+        <p:spPr/>
+        <p:txBody>
+          <a:bodyPr/>
+          <a:lstStyle/>
+          <a:p>
+            <a:pPr lvl="0" indent="0" marL="0">
+              <a:buNone/>
+            </a:pPr>
+            <a:r>
+              <a:rPr/>
+              <a:t>Predictive Performance - Random Forests</a:t>
+            </a:r>
+          </a:p>
+        </p:txBody>
+      </p:sp>
+      <p:sp>
+        <p:nvSpPr>
+          <p:cNvPr id="3" name="Content Placeholder 2"/>
+          <p:cNvSpPr>
+            <a:spLocks noGrp="1"/>
+          </p:cNvSpPr>
+          <p:nvPr>
+            <p:ph idx="1" sz="half"/>
+          </p:nvPr>
+        </p:nvSpPr>
+        <p:spPr/>
+        <p:txBody>
+          <a:bodyPr/>
+          <a:lstStyle/>
+          <a:p>
+            <a:pPr lvl="0"/>
+            <a:r>
+              <a:rPr b="1"/>
+              <a:t>12.11</a:t>
+            </a:r>
+            <a:r>
+              <a:rPr/>
+              <a:t> OOB RMSE / </a:t>
+            </a:r>
+            <a:r>
+              <a:rPr b="1"/>
+              <a:t>12. 18</a:t>
+            </a:r>
+            <a:r>
+              <a:rPr/>
+              <a:t> Test RMSE. Similar RMSEs is good (generalizes well).</a:t>
+            </a:r>
+          </a:p>
+          <a:p>
+            <a:pPr lvl="0"/>
+            <a:r>
+              <a:rPr/>
+              <a:t>As sentencing length goes up, our models prediction becomes more variable. However, the models’ errors scale proportionally to sentencing length. Meaning we don’t typically get crazy predictions for lower sentencing lengths.</a:t>
+            </a:r>
+          </a:p>
+        </p:txBody>
+      </p:sp>
+      <p:pic>
+        <p:nvPicPr>
+          <p:cNvPr descr="Presentation_files/figure-pptx/unnamed-chunk-7-1.png" id="0" name="Picture 1"/>
+          <p:cNvPicPr>
+            <a:picLocks noGrp="1" noChangeAspect="1"/>
+          </p:cNvPicPr>
+          <p:nvPr/>
+        </p:nvPicPr>
+        <p:blipFill>
+          <a:blip r:embed="rId2"/>
+          <a:stretch>
+            <a:fillRect/>
+          </a:stretch>
+        </p:blipFill>
+        <p:spPr bwMode="auto">
+          <a:xfrm>
+            <a:off x="4648200" y="1498600"/>
+            <a:ext cx="4038600" cy="2781300"/>
+          </a:xfrm>
+          <a:prstGeom prst="rect">
+            <a:avLst/>
+          </a:prstGeom>
+          <a:noFill/>
+          <a:ln w="9525">
+            <a:noFill/>
+            <a:headEnd/>
+            <a:tailEnd/>
+          </a:ln>
+        </p:spPr>
+      </p:pic>
+    </p:spTree>
+  </p:cSld>
+</p:sld>
+</file>
+
+<file path=ppt/slides/slide17.xml><?xml version="1.0" encoding="utf-8"?>
+<p:sld xmlns:a="http://schemas.openxmlformats.org/drawingml/2006/main" xmlns:r="http://schemas.openxmlformats.org/officeDocument/2006/relationships" xmlns:p="http://schemas.openxmlformats.org/presentationml/2006/main">
+  <p:cSld>
+    <p:spTree>
+      <p:nvGrpSpPr>
+        <p:cNvPr id="1" name=""/>
+        <p:cNvGrpSpPr/>
+        <p:nvPr/>
+      </p:nvGrpSpPr>
+      <p:grpSpPr>
+        <a:xfrm>
+          <a:off x="0" y="0"/>
+          <a:ext cx="0" cy="0"/>
+          <a:chOff x="0" y="0"/>
+          <a:chExt cx="0" cy="0"/>
+        </a:xfrm>
+      </p:grpSpPr>
+      <p:sp>
+        <p:nvSpPr>
+          <p:cNvPr id="2" name="Title 1"/>
+          <p:cNvSpPr>
+            <a:spLocks noGrp="1"/>
+          </p:cNvSpPr>
+          <p:nvPr>
+            <p:ph type="title"/>
+          </p:nvPr>
+        </p:nvSpPr>
+        <p:spPr/>
+        <p:txBody>
+          <a:bodyPr/>
+          <a:lstStyle/>
+          <a:p>
+            <a:pPr lvl="0" indent="0" marL="0">
+              <a:buNone/>
+            </a:pPr>
+            <a:r>
+              <a:rPr/>
+              <a:t>Conclusion</a:t>
+            </a:r>
+          </a:p>
+        </p:txBody>
+      </p:sp>
+    </p:spTree>
+  </p:cSld>
+</p:sld>
+</file>
+
+<file path=ppt/slides/slide18.xml><?xml version="1.0" encoding="utf-8"?>
+<p:sld xmlns:a="http://schemas.openxmlformats.org/drawingml/2006/main" xmlns:r="http://schemas.openxmlformats.org/officeDocument/2006/relationships" xmlns:p="http://schemas.openxmlformats.org/presentationml/2006/main">
+  <p:cSld>
+    <p:spTree>
+      <p:nvGrpSpPr>
+        <p:cNvPr id="1" name=""/>
+        <p:cNvGrpSpPr/>
+        <p:nvPr/>
+      </p:nvGrpSpPr>
+      <p:grpSpPr>
+        <a:xfrm>
+          <a:off x="0" y="0"/>
+          <a:ext cx="0" cy="0"/>
+          <a:chOff x="0" y="0"/>
+          <a:chExt cx="0" cy="0"/>
+        </a:xfrm>
+      </p:grpSpPr>
+      <p:sp>
+        <p:nvSpPr>
+          <p:cNvPr id="2" name="Title 1"/>
+          <p:cNvSpPr>
+            <a:spLocks noGrp="1"/>
+          </p:cNvSpPr>
+          <p:nvPr>
+            <p:ph type="title"/>
+          </p:nvPr>
+        </p:nvSpPr>
+        <p:spPr/>
+        <p:txBody>
+          <a:bodyPr/>
+          <a:lstStyle/>
+          <a:p>
+            <a:pPr lvl="0" indent="0" marL="0">
+              <a:buNone/>
+            </a:pPr>
+            <a:r>
+              <a:rPr/>
+              <a:t>References</a:t>
+            </a:r>
+          </a:p>
+        </p:txBody>
+      </p:sp>
+      <p:sp>
+        <p:nvSpPr>
+          <p:cNvPr id="3" name="Content Placeholder 2"/>
+          <p:cNvSpPr>
+            <a:spLocks noGrp="1"/>
+          </p:cNvSpPr>
+          <p:nvPr>
+            <p:ph idx="1"/>
+          </p:nvPr>
+        </p:nvSpPr>
+        <p:spPr/>
+        <p:txBody>
+          <a:bodyPr/>
+          <a:lstStyle/>
+          <a:p>
+            <a:pPr lvl="0" indent="0" marL="0">
+              <a:buNone/>
+            </a:pPr>
+            <a:r>
+              <a:rPr/>
+              <a:t>-https://www.kaggle.com/datasets/davidjfisher/illinois-doc-labeled-faces-dataset -https://www.idoc.state.il.us</a:t>
+            </a:r>
+          </a:p>
+        </p:txBody>
+      </p:sp>
+    </p:spTree>
+  </p:cSld>
+</p:sld>
+</file>
+
+<file path=ppt/slides/slide19.xml><?xml version="1.0" encoding="utf-8"?>
+<p:sld xmlns:a="http://schemas.openxmlformats.org/drawingml/2006/main" xmlns:r="http://schemas.openxmlformats.org/officeDocument/2006/relationships" xmlns:p="http://schemas.openxmlformats.org/presentationml/2006/main">
+  <p:cSld>
+    <p:spTree>
+      <p:nvGrpSpPr>
+        <p:cNvPr id="1" name=""/>
+        <p:cNvGrpSpPr/>
+        <p:nvPr/>
+      </p:nvGrpSpPr>
+      <p:grpSpPr>
+        <a:xfrm>
+          <a:off x="0" y="0"/>
+          <a:ext cx="0" cy="0"/>
+          <a:chOff x="0" y="0"/>
+          <a:chExt cx="0" cy="0"/>
+        </a:xfrm>
+      </p:grpSpPr>
+      <p:sp>
+        <p:nvSpPr>
+          <p:cNvPr id="2" name="Title 1"/>
+          <p:cNvSpPr>
+            <a:spLocks noGrp="1"/>
+          </p:cNvSpPr>
+          <p:nvPr>
+            <p:ph type="title"/>
+          </p:nvPr>
+        </p:nvSpPr>
+        <p:spPr/>
+        <p:txBody>
+          <a:bodyPr/>
+          <a:lstStyle/>
+          <a:p>
+            <a:pPr lvl="0" indent="0" marL="0">
+              <a:buNone/>
+            </a:pPr>
+            <a:r>
+              <a:rPr/>
+              <a:t>Questions?</a:t>
+            </a:r>
+          </a:p>
+        </p:txBody>
+      </p:sp>
+    </p:spTree>
+  </p:cSld>
+</p:sld>
+</file>
+
+<file path=ppt/slides/slide2.xml><?xml version="1.0" encoding="utf-8"?>
+<p:sld xmlns:a="http://schemas.openxmlformats.org/drawingml/2006/main" xmlns:r="http://schemas.openxmlformats.org/officeDocument/2006/relationships" xmlns:p="http://schemas.openxmlformats.org/presentationml/2006/main">
+  <p:cSld>
+    <p:spTree>
+      <p:nvGrpSpPr>
+        <p:cNvPr id="1" name=""/>
+        <p:cNvGrpSpPr/>
+        <p:nvPr/>
+      </p:nvGrpSpPr>
+      <p:grpSpPr>
+        <a:xfrm>
+          <a:off x="0" y="0"/>
+          <a:ext cx="0" cy="0"/>
+          <a:chOff x="0" y="0"/>
+          <a:chExt cx="0" cy="0"/>
+        </a:xfrm>
+      </p:grpSpPr>
+      <p:sp>
+        <p:nvSpPr>
+          <p:cNvPr id="2" name="Title 1"/>
+          <p:cNvSpPr>
+            <a:spLocks noGrp="1"/>
+          </p:cNvSpPr>
+          <p:nvPr>
+            <p:ph type="title"/>
+          </p:nvPr>
+        </p:nvSpPr>
+        <p:spPr/>
+        <p:txBody>
+          <a:bodyPr/>
+          <a:lstStyle/>
+          <a:p>
+            <a:pPr lvl="0" indent="0" marL="0">
+              <a:buNone/>
+            </a:pPr>
+            <a:r>
+              <a:rPr/>
+              <a:t>Dataset and Preparation</a:t>
+            </a:r>
+          </a:p>
+        </p:txBody>
+      </p:sp>
+      <p:sp>
+        <p:nvSpPr>
+          <p:cNvPr id="3" name="Content Placeholder 2"/>
+          <p:cNvSpPr>
+            <a:spLocks noGrp="1"/>
+          </p:cNvSpPr>
+          <p:nvPr>
+            <p:ph idx="1"/>
+          </p:nvPr>
+        </p:nvSpPr>
+        <p:spPr/>
+        <p:txBody>
+          <a:bodyPr/>
+          <a:lstStyle/>
+          <a:p>
+            <a:pPr lvl="0" indent="0" marL="0">
+              <a:buNone/>
+            </a:pPr>
+            <a:r>
+              <a:rPr/>
+              <a:t>Our data comes from Kaggle, it consists of 3 CSV files with data scraped off the Illinois Department Of Corrections website.</a:t>
+            </a:r>
+          </a:p>
+          <a:p>
+            <a:pPr lvl="0"/>
+            <a:r>
+              <a:rPr/>
+              <a:t>Contains information 61,052 individuals who have been incarcerated in Illinois from 1952-2018.</a:t>
+            </a:r>
+          </a:p>
+          <a:p>
+            <a:pPr lvl="0"/>
+            <a:r>
+              <a:rPr/>
+              <a:t>“Person” dataset includes simple descriptive information on the person: Name, DOB, Sentencing Date, Race, Eye Color, Hair Color, etc…</a:t>
+            </a:r>
+          </a:p>
+          <a:p>
+            <a:pPr lvl="0"/>
+            <a:r>
+              <a:rPr/>
+              <a:t>“Marks” has multiple rows per person listing any additional descriptive features like scars and tattoos.</a:t>
+            </a:r>
+          </a:p>
+          <a:p>
+            <a:pPr lvl="0"/>
+            <a:r>
+              <a:rPr/>
+              <a:t>“Sentencing” is information on the charges faced by the individual, the crime categorized by Illinois’ felony classes, and our response variable, sentencing time.</a:t>
+            </a:r>
+          </a:p>
+        </p:txBody>
+      </p:sp>
+    </p:spTree>
+  </p:cSld>
+  <p:timing>
+    <p:tnLst>
+      <p:par>
+        <p:cTn id="1" dur="indefinite" restart="never" nodeType="tmRoot">
+          <p:childTnLst>
+            <p:seq concurrent="1" nextAc="seek">
+              <p:cTn id="2" dur="indefinite" nodeType="mainSeq">
+                <p:childTnLst>
+                  <p:par>
+                    <p:cTn id="3" fill="hold">
+                      <p:stCondLst>
+                        <p:cond delay="indefinite"/>
+                      </p:stCondLst>
+                      <p:childTnLst>
+                        <p:par>
+                          <p:cTn id="4" fill="hold">
+                            <p:stCondLst>
+                              <p:cond delay="0"/>
+                            </p:stCondLst>
+                            <p:childTnLst>
+                              <p:par>
+                                <p:cTn id="5" presetID="1" presetClass="entr" presetSubtype="0" fill="hold" grpId="0" nodeType="clickEffect">
+                                  <p:stCondLst>
+                                    <p:cond delay="0"/>
+                                  </p:stCondLst>
+                                  <p:childTnLst>
+                                    <p:set>
+                                      <p:cBhvr>
+                                        <p:cTn id="6" dur="1" fill="hold">
+                                          <p:stCondLst>
+                                            <p:cond delay="0"/>
+                                          </p:stCondLst>
+                                        </p:cTn>
+                                        <p:tgtEl>
+                                          <p:spTgt spid="3">
+                                            <p:txEl>
+                                              <p:pRg st="1" end="1"/>
+                                            </p:txEl>
+                                          </p:spTgt>
+                                        </p:tgtEl>
+                                        <p:attrNameLst>
+                                          <p:attrName>style.visibility</p:attrName>
+                                        </p:attrNameLst>
+                                      </p:cBhvr>
+                                      <p:to>
+                                        <p:strVal val="visible"/>
+                                      </p:to>
+                                    </p:set>
+                                  </p:childTnLst>
+                                </p:cTn>
+                              </p:par>
+                            </p:childTnLst>
+                          </p:cTn>
+                        </p:par>
+                      </p:childTnLst>
+                    </p:cTn>
+                  </p:par>
+                  <p:par>
+                    <p:cTn id="7" fill="hold">
+                      <p:stCondLst>
+                        <p:cond delay="indefinite"/>
+                      </p:stCondLst>
+                      <p:childTnLst>
+                        <p:par>
+                          <p:cTn id="8" fill="hold">
+                            <p:stCondLst>
+                              <p:cond delay="0"/>
+                            </p:stCondLst>
+                            <p:childTnLst>
+                              <p:par>
+                                <p:cTn id="9" presetID="1" presetClass="entr" presetSubtype="0" fill="hold" grpId="0" nodeType="clickEffect">
+                                  <p:stCondLst>
+                                    <p:cond delay="0"/>
+                                  </p:stCondLst>
+                                  <p:childTnLst>
+                                    <p:set>
+                                      <p:cBhvr>
+                                        <p:cTn id="10" dur="1" fill="hold">
+                                          <p:stCondLst>
+                                            <p:cond delay="0"/>
+                                          </p:stCondLst>
+                                        </p:cTn>
+                                        <p:tgtEl>
+                                          <p:spTgt spid="3">
+                                            <p:txEl>
+                                              <p:pRg st="2" end="2"/>
+                                            </p:txEl>
+                                          </p:spTgt>
+                                        </p:tgtEl>
+                                        <p:attrNameLst>
+                                          <p:attrName>style.visibility</p:attrName>
+                                        </p:attrNameLst>
+                                      </p:cBhvr>
+                                      <p:to>
+                                        <p:strVal val="visible"/>
+                                      </p:to>
+                                    </p:set>
+                                  </p:childTnLst>
+                                </p:cTn>
+                              </p:par>
+                            </p:childTnLst>
+                          </p:cTn>
+                        </p:par>
+                      </p:childTnLst>
+                    </p:cTn>
+                  </p:par>
+                  <p:par>
+                    <p:cTn id="11" fill="hold">
+                      <p:stCondLst>
+                        <p:cond delay="indefinite"/>
+                      </p:stCondLst>
+                      <p:childTnLst>
+                        <p:par>
+                          <p:cTn id="12" fill="hold">
+                            <p:stCondLst>
+                              <p:cond delay="0"/>
+                            </p:stCondLst>
+                            <p:childTnLst>
+                              <p:par>
+                                <p:cTn id="13" presetID="1" presetClass="entr" presetSubtype="0" fill="hold" grpId="0" nodeType="clickEffect">
+                                  <p:stCondLst>
+                                    <p:cond delay="0"/>
+                                  </p:stCondLst>
+                                  <p:childTnLst>
+                                    <p:set>
+                                      <p:cBhvr>
+                                        <p:cTn id="14" dur="1" fill="hold">
+                                          <p:stCondLst>
+                                            <p:cond delay="0"/>
+                                          </p:stCondLst>
+                                        </p:cTn>
+                                        <p:tgtEl>
+                                          <p:spTgt spid="3">
+                                            <p:txEl>
+                                              <p:pRg st="3" end="3"/>
+                                            </p:txEl>
+                                          </p:spTgt>
+                                        </p:tgtEl>
+                                        <p:attrNameLst>
+                                          <p:attrName>style.visibility</p:attrName>
+                                        </p:attrNameLst>
+                                      </p:cBhvr>
+                                      <p:to>
+                                        <p:strVal val="visible"/>
+                                      </p:to>
+                                    </p:set>
+                                  </p:childTnLst>
+                                </p:cTn>
+                              </p:par>
+                            </p:childTnLst>
+                          </p:cTn>
+                        </p:par>
+                      </p:childTnLst>
+                    </p:cTn>
+                  </p:par>
+                  <p:par>
+                    <p:cTn id="15" fill="hold">
+                      <p:stCondLst>
+                        <p:cond delay="indefinite"/>
+                      </p:stCondLst>
+                      <p:childTnLst>
+                        <p:par>
+                          <p:cTn id="16" fill="hold">
+                            <p:stCondLst>
+                              <p:cond delay="0"/>
+                            </p:stCondLst>
+                            <p:childTnLst>
+                              <p:par>
+                                <p:cTn id="17" presetID="1" presetClass="entr" presetSubtype="0" fill="hold" grpId="0" nodeType="clickEffect">
+                                  <p:stCondLst>
+                                    <p:cond delay="0"/>
+                                  </p:stCondLst>
+                                  <p:childTnLst>
+                                    <p:set>
+                                      <p:cBhvr>
+                                        <p:cTn id="18" dur="1" fill="hold">
+                                          <p:stCondLst>
+                                            <p:cond delay="0"/>
+                                          </p:stCondLst>
+                                        </p:cTn>
+                                        <p:tgtEl>
+                                          <p:spTgt spid="3">
+                                            <p:txEl>
+                                              <p:pRg st="4" end="4"/>
+                                            </p:txEl>
+                                          </p:spTgt>
+                                        </p:tgtEl>
+                                        <p:attrNameLst>
+                                          <p:attrName>style.visibility</p:attrName>
+                                        </p:attrNameLst>
+                                      </p:cBhvr>
+                                      <p:to>
+                                        <p:strVal val="visible"/>
+                                      </p:to>
+                                    </p:set>
+                                  </p:childTnLst>
+                                </p:cTn>
+                              </p:par>
+                            </p:childTnLst>
+                          </p:cTn>
+                        </p:par>
+                      </p:childTnLst>
+                    </p:cTn>
+                  </p:par>
+                </p:childTnLst>
+              </p:cTn>
+              <p:prevCondLst>
+                <p:cond evt="onPrev" delay="0">
+                  <p:tgtEl>
+                    <p:sldTgt/>
+                  </p:tgtEl>
+                </p:cond>
+              </p:prevCondLst>
+              <p:nextCondLst>
+                <p:cond evt="onNext" delay="0">
+                  <p:tgtEl>
+                    <p:sldTgt/>
+                  </p:tgtEl>
+                </p:cond>
+              </p:nextCondLst>
+            </p:seq>
+          </p:childTnLst>
+        </p:cTn>
+      </p:par>
+    </p:tnLst>
+    <p:bldLst>
+      <p:bldP spid="3" grpId="0" uiExpand="1" build="p"/>
+    </p:bldLst>
+  </p:timing>
+</p:sld>
+</file>
+
+<file path=ppt/slides/slide20.xml><?xml version="1.0" encoding="utf-8"?>
+<p:sld xmlns:a="http://schemas.openxmlformats.org/drawingml/2006/main" xmlns:r="http://schemas.openxmlformats.org/officeDocument/2006/relationships" xmlns:p="http://schemas.openxmlformats.org/presentationml/2006/main">
+  <p:cSld>
+    <p:spTree>
+      <p:nvGrpSpPr>
+        <p:cNvPr id="1" name=""/>
+        <p:cNvGrpSpPr/>
+        <p:nvPr/>
+      </p:nvGrpSpPr>
+      <p:grpSpPr>
+        <a:xfrm>
+          <a:off x="0" y="0"/>
+          <a:ext cx="0" cy="0"/>
+          <a:chOff x="0" y="0"/>
+          <a:chExt cx="0" cy="0"/>
+        </a:xfrm>
+      </p:grpSpPr>
+      <p:sp>
+        <p:nvSpPr>
+          <p:cNvPr id="2" name="Title 1"/>
+          <p:cNvSpPr>
+            <a:spLocks noGrp="1"/>
+          </p:cNvSpPr>
+          <p:nvPr>
+            <p:ph type="title"/>
+          </p:nvPr>
+        </p:nvSpPr>
+        <p:spPr/>
+        <p:txBody>
+          <a:bodyPr/>
+          <a:lstStyle/>
+          <a:p>
+            <a:pPr lvl="0" indent="0" marL="0">
+              <a:buNone/>
+            </a:pPr>
+            <a:r>
+              <a:rPr/>
+              <a:t>Bonus Slides - Complete Variable Importance for RF</a:t>
+            </a:r>
+          </a:p>
+        </p:txBody>
+      </p:sp>
+      <p:pic>
+        <p:nvPicPr>
+          <p:cNvPr descr="Presentation_files/figure-pptx/unnamed-chunk-8-1.png" id="0" name="Picture 1"/>
+          <p:cNvPicPr>
+            <a:picLocks noGrp="1" noChangeAspect="1"/>
+          </p:cNvPicPr>
+          <p:nvPr/>
+        </p:nvPicPr>
+        <p:blipFill>
+          <a:blip r:embed="rId2"/>
+          <a:stretch>
+            <a:fillRect/>
+          </a:stretch>
+        </p:blipFill>
+        <p:spPr bwMode="auto">
+          <a:xfrm>
+            <a:off x="2108200" y="1193800"/>
+            <a:ext cx="4927600" cy="3390900"/>
+          </a:xfrm>
+          <a:prstGeom prst="rect">
+            <a:avLst/>
+          </a:prstGeom>
+          <a:noFill/>
+          <a:ln w="9525">
+            <a:noFill/>
+            <a:headEnd/>
+            <a:tailEnd/>
+          </a:ln>
+        </p:spPr>
+      </p:pic>
+    </p:spTree>
+  </p:cSld>
+</p:sld>
+</file>
+
+<file path=ppt/slides/slide3.xml><?xml version="1.0" encoding="utf-8"?>
+<p:sld xmlns:a="http://schemas.openxmlformats.org/drawingml/2006/main" xmlns:r="http://schemas.openxmlformats.org/officeDocument/2006/relationships" xmlns:p="http://schemas.openxmlformats.org/presentationml/2006/main">
+  <p:cSld>
+    <p:spTree>
+      <p:nvGrpSpPr>
+        <p:cNvPr id="1" name=""/>
+        <p:cNvGrpSpPr/>
+        <p:nvPr/>
+      </p:nvGrpSpPr>
+      <p:grpSpPr>
+        <a:xfrm>
+          <a:off x="0" y="0"/>
+          <a:ext cx="0" cy="0"/>
+          <a:chOff x="0" y="0"/>
+          <a:chExt cx="0" cy="0"/>
+        </a:xfrm>
+      </p:grpSpPr>
+      <p:sp>
+        <p:nvSpPr>
+          <p:cNvPr id="2" name="Title 1"/>
+          <p:cNvSpPr>
+            <a:spLocks noGrp="1"/>
+          </p:cNvSpPr>
+          <p:nvPr>
+            <p:ph type="title"/>
+          </p:nvPr>
+        </p:nvSpPr>
+        <p:spPr/>
+        <p:txBody>
+          <a:bodyPr/>
+          <a:lstStyle/>
+          <a:p>
+            <a:pPr lvl="0" indent="0" marL="0">
+              <a:buNone/>
+            </a:pPr>
+            <a:r>
+              <a:rPr/>
+              <a:t>Research Questions</a:t>
+            </a:r>
+          </a:p>
+        </p:txBody>
+      </p:sp>
+      <p:sp>
+        <p:nvSpPr>
+          <p:cNvPr id="3" name="Content Placeholder 2"/>
+          <p:cNvSpPr>
+            <a:spLocks noGrp="1"/>
+          </p:cNvSpPr>
+          <p:nvPr>
+            <p:ph idx="1"/>
+          </p:nvPr>
+        </p:nvSpPr>
+        <p:spPr/>
+        <p:txBody>
+          <a:bodyPr/>
+          <a:lstStyle/>
+          <a:p>
+            <a:pPr lvl="0"/>
+            <a:r>
+              <a:rPr/>
+              <a:t>What predictors have the strongest effect on sentencing length?</a:t>
+            </a:r>
+          </a:p>
+          <a:p>
+            <a:pPr lvl="0"/>
+            <a:r>
+              <a:rPr/>
+              <a:t>How accurately can we predict sentencing length?</a:t>
+            </a:r>
+          </a:p>
+          <a:p>
+            <a:pPr lvl="0"/>
+            <a:r>
+              <a:rPr/>
+              <a:t>What predictors have the strongest effect on offence category?</a:t>
+            </a:r>
+          </a:p>
+          <a:p>
+            <a:pPr lvl="0"/>
+            <a:r>
+              <a:rPr/>
+              <a:t>How accurately can we predict offence categories?</a:t>
+            </a:r>
+          </a:p>
+        </p:txBody>
+      </p:sp>
+    </p:spTree>
+  </p:cSld>
+  <p:timing>
+    <p:tnLst>
+      <p:par>
+        <p:cTn id="1" dur="indefinite" restart="never" nodeType="tmRoot">
+          <p:childTnLst>
+            <p:seq concurrent="1" nextAc="seek">
+              <p:cTn id="2" dur="indefinite" nodeType="mainSeq">
+                <p:childTnLst>
+                  <p:par>
+                    <p:cTn id="3" fill="hold">
+                      <p:stCondLst>
+                        <p:cond delay="indefinite"/>
+                      </p:stCondLst>
+                      <p:childTnLst>
+                        <p:par>
+                          <p:cTn id="4" fill="hold">
+                            <p:stCondLst>
+                              <p:cond delay="0"/>
+                            </p:stCondLst>
+                            <p:childTnLst>
+                              <p:par>
+                                <p:cTn id="5" presetID="1" presetClass="entr" presetSubtype="0" fill="hold" grpId="0" nodeType="clickEffect">
+                                  <p:stCondLst>
+                                    <p:cond delay="0"/>
+                                  </p:stCondLst>
+                                  <p:childTnLst>
+                                    <p:set>
+                                      <p:cBhvr>
+                                        <p:cTn id="6" dur="1" fill="hold">
+                                          <p:stCondLst>
+                                            <p:cond delay="0"/>
+                                          </p:stCondLst>
+                                        </p:cTn>
+                                        <p:tgtEl>
+                                          <p:spTgt spid="3">
+                                            <p:txEl>
+                                              <p:pRg st="0" end="0"/>
+                                            </p:txEl>
+                                          </p:spTgt>
+                                        </p:tgtEl>
+                                        <p:attrNameLst>
+                                          <p:attrName>style.visibility</p:attrName>
+                                        </p:attrNameLst>
+                                      </p:cBhvr>
+                                      <p:to>
+                                        <p:strVal val="visible"/>
+                                      </p:to>
+                                    </p:set>
+                                  </p:childTnLst>
+                                </p:cTn>
+                              </p:par>
+                            </p:childTnLst>
+                          </p:cTn>
+                        </p:par>
+                      </p:childTnLst>
+                    </p:cTn>
+                  </p:par>
+                  <p:par>
+                    <p:cTn id="7" fill="hold">
+                      <p:stCondLst>
+                        <p:cond delay="indefinite"/>
+                      </p:stCondLst>
+                      <p:childTnLst>
+                        <p:par>
+                          <p:cTn id="8" fill="hold">
+                            <p:stCondLst>
+                              <p:cond delay="0"/>
+                            </p:stCondLst>
+                            <p:childTnLst>
+                              <p:par>
+                                <p:cTn id="9" presetID="1" presetClass="entr" presetSubtype="0" fill="hold" grpId="0" nodeType="clickEffect">
+                                  <p:stCondLst>
+                                    <p:cond delay="0"/>
+                                  </p:stCondLst>
+                                  <p:childTnLst>
+                                    <p:set>
+                                      <p:cBhvr>
+                                        <p:cTn id="10" dur="1" fill="hold">
+                                          <p:stCondLst>
+                                            <p:cond delay="0"/>
+                                          </p:stCondLst>
+                                        </p:cTn>
+                                        <p:tgtEl>
+                                          <p:spTgt spid="3">
+                                            <p:txEl>
+                                              <p:pRg st="1" end="1"/>
+                                            </p:txEl>
+                                          </p:spTgt>
+                                        </p:tgtEl>
+                                        <p:attrNameLst>
+                                          <p:attrName>style.visibility</p:attrName>
+                                        </p:attrNameLst>
+                                      </p:cBhvr>
+                                      <p:to>
+                                        <p:strVal val="visible"/>
+                                      </p:to>
+                                    </p:set>
+                                  </p:childTnLst>
+                                </p:cTn>
+                              </p:par>
+                            </p:childTnLst>
+                          </p:cTn>
+                        </p:par>
+                      </p:childTnLst>
+                    </p:cTn>
+                  </p:par>
+                  <p:par>
+                    <p:cTn id="11" fill="hold">
+                      <p:stCondLst>
+                        <p:cond delay="indefinite"/>
+                      </p:stCondLst>
+                      <p:childTnLst>
+                        <p:par>
+                          <p:cTn id="12" fill="hold">
+                            <p:stCondLst>
+                              <p:cond delay="0"/>
+                            </p:stCondLst>
+                            <p:childTnLst>
+                              <p:par>
+                                <p:cTn id="13" presetID="1" presetClass="entr" presetSubtype="0" fill="hold" grpId="0" nodeType="clickEffect">
+                                  <p:stCondLst>
+                                    <p:cond delay="0"/>
+                                  </p:stCondLst>
+                                  <p:childTnLst>
+                                    <p:set>
+                                      <p:cBhvr>
+                                        <p:cTn id="14" dur="1" fill="hold">
+                                          <p:stCondLst>
+                                            <p:cond delay="0"/>
+                                          </p:stCondLst>
+                                        </p:cTn>
+                                        <p:tgtEl>
+                                          <p:spTgt spid="3">
+                                            <p:txEl>
+                                              <p:pRg st="2" end="2"/>
+                                            </p:txEl>
+                                          </p:spTgt>
+                                        </p:tgtEl>
+                                        <p:attrNameLst>
+                                          <p:attrName>style.visibility</p:attrName>
+                                        </p:attrNameLst>
+                                      </p:cBhvr>
+                                      <p:to>
+                                        <p:strVal val="visible"/>
+                                      </p:to>
+                                    </p:set>
+                                  </p:childTnLst>
+                                </p:cTn>
+                              </p:par>
+                            </p:childTnLst>
+                          </p:cTn>
+                        </p:par>
+                      </p:childTnLst>
+                    </p:cTn>
+                  </p:par>
+                  <p:par>
+                    <p:cTn id="15" fill="hold">
+                      <p:stCondLst>
+                        <p:cond delay="indefinite"/>
+                      </p:stCondLst>
+                      <p:childTnLst>
+                        <p:par>
+                          <p:cTn id="16" fill="hold">
+                            <p:stCondLst>
+                              <p:cond delay="0"/>
+                            </p:stCondLst>
+                            <p:childTnLst>
+                              <p:par>
+                                <p:cTn id="17" presetID="1" presetClass="entr" presetSubtype="0" fill="hold" grpId="0" nodeType="clickEffect">
+                                  <p:stCondLst>
+                                    <p:cond delay="0"/>
+                                  </p:stCondLst>
+                                  <p:childTnLst>
+                                    <p:set>
+                                      <p:cBhvr>
+                                        <p:cTn id="18" dur="1" fill="hold">
+                                          <p:stCondLst>
+                                            <p:cond delay="0"/>
+                                          </p:stCondLst>
+                                        </p:cTn>
+                                        <p:tgtEl>
+                                          <p:spTgt spid="3">
+                                            <p:txEl>
+                                              <p:pRg st="3" end="3"/>
+                                            </p:txEl>
+                                          </p:spTgt>
+                                        </p:tgtEl>
+                                        <p:attrNameLst>
+                                          <p:attrName>style.visibility</p:attrName>
+                                        </p:attrNameLst>
+                                      </p:cBhvr>
+                                      <p:to>
+                                        <p:strVal val="visible"/>
+                                      </p:to>
+                                    </p:set>
+                                  </p:childTnLst>
+                                </p:cTn>
+                              </p:par>
+                            </p:childTnLst>
+                          </p:cTn>
+                        </p:par>
+                      </p:childTnLst>
+                    </p:cTn>
+                  </p:par>
+                </p:childTnLst>
+              </p:cTn>
+              <p:prevCondLst>
+                <p:cond evt="onPrev" delay="0">
+                  <p:tgtEl>
+                    <p:sldTgt/>
+                  </p:tgtEl>
+                </p:cond>
+              </p:prevCondLst>
+              <p:nextCondLst>
+                <p:cond evt="onNext" delay="0">
+                  <p:tgtEl>
+                    <p:sldTgt/>
+                  </p:tgtEl>
+                </p:cond>
+              </p:nextCondLst>
+            </p:seq>
+          </p:childTnLst>
+        </p:cTn>
+      </p:par>
+    </p:tnLst>
+    <p:bldLst>
+      <p:bldP spid="3" grpId="0" uiExpand="1" build="p"/>
+    </p:bldLst>
+  </p:timing>
+</p:sld>
+</file>
+
+<file path=ppt/slides/slide4.xml><?xml version="1.0" encoding="utf-8"?>
+<p:sld xmlns:a="http://schemas.openxmlformats.org/drawingml/2006/main" xmlns:r="http://schemas.openxmlformats.org/officeDocument/2006/relationships" xmlns:p="http://schemas.openxmlformats.org/presentationml/2006/main">
+  <p:cSld>
+    <p:spTree>
+      <p:nvGrpSpPr>
+        <p:cNvPr id="1" name=""/>
+        <p:cNvGrpSpPr/>
+        <p:nvPr/>
+      </p:nvGrpSpPr>
+      <p:grpSpPr>
+        <a:xfrm>
+          <a:off x="0" y="0"/>
+          <a:ext cx="0" cy="0"/>
+          <a:chOff x="0" y="0"/>
+          <a:chExt cx="0" cy="0"/>
+        </a:xfrm>
+      </p:grpSpPr>
+      <p:sp>
+        <p:nvSpPr>
+          <p:cNvPr id="2" name="Title 1"/>
+          <p:cNvSpPr>
+            <a:spLocks noGrp="1"/>
+          </p:cNvSpPr>
+          <p:nvPr>
+            <p:ph type="title"/>
+          </p:nvPr>
+        </p:nvSpPr>
+        <p:spPr/>
+        <p:txBody>
+          <a:bodyPr/>
+          <a:lstStyle/>
+          <a:p>
+            <a:pPr lvl="0" indent="0" marL="0">
+              <a:buNone/>
+            </a:pPr>
+            <a:r>
+              <a:rPr/>
+              <a:t>K-Nearest Neighbors Background</a:t>
+            </a:r>
+          </a:p>
+        </p:txBody>
+      </p:sp>
+      <p:sp>
+        <p:nvSpPr>
+          <p:cNvPr id="3" name="Content Placeholder 2"/>
+          <p:cNvSpPr>
+            <a:spLocks noGrp="1"/>
+          </p:cNvSpPr>
+          <p:nvPr>
+            <p:ph idx="1"/>
+          </p:nvPr>
+        </p:nvSpPr>
+        <p:spPr/>
+        <p:txBody>
+          <a:bodyPr/>
+          <a:lstStyle/>
+          <a:p>
+            <a:pPr lvl="0"/>
+            <a:r>
+              <a:rPr/>
+              <a:t>K-Nearest Neighbors (KNN) is a classification method that loops through each point in a dataset, and identifies the k points that are closest to that point</a:t>
+            </a:r>
+          </a:p>
+          <a:p>
+            <a:pPr lvl="1"/>
+            <a:r>
+              <a:rPr/>
+              <a:t>This k value is adjustable and helps determine the classifier itself, so tuning k is critical for optimizing performance.</a:t>
+            </a:r>
+          </a:p>
+        </p:txBody>
+      </p:sp>
+    </p:spTree>
+  </p:cSld>
+</p:sld>
+</file>
+
+<file path=ppt/slides/slide5.xml><?xml version="1.0" encoding="utf-8"?>
+<p:sld xmlns:a="http://schemas.openxmlformats.org/drawingml/2006/main" xmlns:r="http://schemas.openxmlformats.org/officeDocument/2006/relationships" xmlns:p="http://schemas.openxmlformats.org/presentationml/2006/main">
+  <p:cSld>
+    <p:spTree>
+      <p:nvGrpSpPr>
+        <p:cNvPr id="1" name=""/>
+        <p:cNvGrpSpPr/>
+        <p:nvPr/>
+      </p:nvGrpSpPr>
+      <p:grpSpPr>
+        <a:xfrm>
+          <a:off x="0" y="0"/>
+          <a:ext cx="0" cy="0"/>
+          <a:chOff x="0" y="0"/>
+          <a:chExt cx="0" cy="0"/>
+        </a:xfrm>
+      </p:grpSpPr>
+      <p:sp>
+        <p:nvSpPr>
+          <p:cNvPr id="2" name="Title 1"/>
+          <p:cNvSpPr>
+            <a:spLocks noGrp="1"/>
+          </p:cNvSpPr>
+          <p:nvPr>
+            <p:ph type="title"/>
+          </p:nvPr>
+        </p:nvSpPr>
+        <p:spPr/>
+        <p:txBody>
+          <a:bodyPr/>
+          <a:lstStyle/>
+          <a:p>
+            <a:pPr lvl="0" indent="0" marL="0">
+              <a:buNone/>
+            </a:pPr>
+            <a:r>
+              <a:rPr/>
+              <a:t>KNN on Offense Category</a:t>
+            </a:r>
+          </a:p>
+        </p:txBody>
+      </p:sp>
+      <p:sp>
+        <p:nvSpPr>
+          <p:cNvPr id="3" name="Content Placeholder 2"/>
+          <p:cNvSpPr>
+            <a:spLocks noGrp="1"/>
+          </p:cNvSpPr>
+          <p:nvPr>
+            <p:ph idx="1"/>
+          </p:nvPr>
+        </p:nvSpPr>
+        <p:spPr/>
+        <p:txBody>
+          <a:bodyPr/>
+          <a:lstStyle/>
+          <a:p>
+            <a:pPr lvl="0"/>
+            <a:r>
+              <a:rPr b="1"/>
+              <a:t>Goal:</a:t>
+            </a:r>
+            <a:r>
+              <a:rPr/>
+              <a:t> Predict offense category for individuals based on all other variables.</a:t>
+            </a:r>
+          </a:p>
+          <a:p>
+            <a:pPr lvl="1"/>
+            <a:r>
+              <a:rPr b="1"/>
+              <a:t>Offense categories (manually created):</a:t>
+            </a:r>
+            <a:r>
+              <a:rPr/>
+              <a:t> controlled substance possession without a prescription, burglary, murder, armed robbery, theft (identity or property), battery, sexual assault, forgery, kidnapping, illegal firearm/weapon/handgun use or possession, harassment, bribery, drug/meth manufacturing, vehicular hijacking/theft, DUI, child porn, obstructing justice, home invasion, and other</a:t>
+            </a:r>
+          </a:p>
+          <a:p>
+            <a:pPr lvl="2"/>
+            <a:r>
+              <a:rPr/>
+              <a:t>Categories besides other accounted for &gt;90% of offenses</a:t>
+            </a:r>
+          </a:p>
+        </p:txBody>
+      </p:sp>
+    </p:spTree>
+  </p:cSld>
+</p:sld>
+</file>
+
+<file path=ppt/slides/slide6.xml><?xml version="1.0" encoding="utf-8"?>
+<p:sld xmlns:a="http://schemas.openxmlformats.org/drawingml/2006/main" xmlns:r="http://schemas.openxmlformats.org/officeDocument/2006/relationships" xmlns:p="http://schemas.openxmlformats.org/presentationml/2006/main">
+  <p:cSld>
+    <p:spTree>
+      <p:nvGrpSpPr>
+        <p:cNvPr id="1" name=""/>
+        <p:cNvGrpSpPr/>
+        <p:nvPr/>
+      </p:nvGrpSpPr>
+      <p:grpSpPr>
+        <a:xfrm>
+          <a:off x="0" y="0"/>
+          <a:ext cx="0" cy="0"/>
+          <a:chOff x="0" y="0"/>
+          <a:chExt cx="0" cy="0"/>
+        </a:xfrm>
+      </p:grpSpPr>
+      <p:sp>
+        <p:nvSpPr>
+          <p:cNvPr id="2" name="Title 1"/>
+          <p:cNvSpPr>
+            <a:spLocks noGrp="1"/>
+          </p:cNvSpPr>
+          <p:nvPr>
+            <p:ph type="title"/>
+          </p:nvPr>
+        </p:nvSpPr>
+        <p:spPr/>
+        <p:txBody>
+          <a:bodyPr/>
+          <a:lstStyle/>
+          <a:p>
+            <a:pPr lvl="0" indent="0" marL="0">
+              <a:buNone/>
+            </a:pPr>
+            <a:r>
+              <a:rPr/>
+              <a:t>Drawbacks/Issues</a:t>
+            </a:r>
+          </a:p>
+        </p:txBody>
+      </p:sp>
+      <p:sp>
+        <p:nvSpPr>
+          <p:cNvPr id="3" name="Content Placeholder 2"/>
+          <p:cNvSpPr>
+            <a:spLocks noGrp="1"/>
+          </p:cNvSpPr>
+          <p:nvPr>
+            <p:ph idx="1"/>
+          </p:nvPr>
+        </p:nvSpPr>
+        <p:spPr/>
+        <p:txBody>
+          <a:bodyPr/>
+          <a:lstStyle/>
+          <a:p>
+            <a:pPr lvl="0"/>
+            <a:r>
+              <a:rPr b="1"/>
+              <a:t>Problem:</a:t>
+            </a:r>
+            <a:r>
+              <a:rPr/>
+              <a:t> This method can be extremely time-expensive with large training sets due to the nature of looping through each point, as I found out during data fitting</a:t>
+            </a:r>
+          </a:p>
+          <a:p>
+            <a:pPr lvl="1"/>
+            <a:r>
+              <a:rPr/>
+              <a:t>47,000+ training observations (for an 80-20 split)</a:t>
+            </a:r>
+          </a:p>
+          <a:p>
+            <a:pPr lvl="1"/>
+            <a:r>
+              <a:rPr/>
+              <a:t>2.75 hour runtime</a:t>
+            </a:r>
+          </a:p>
+          <a:p>
+            <a:pPr lvl="0"/>
+            <a:r>
+              <a:rPr/>
+              <a:t>No variable selection or subset with KNN</a:t>
+            </a:r>
+          </a:p>
+        </p:txBody>
+      </p:sp>
+    </p:spTree>
+  </p:cSld>
+</p:sld>
+</file>
+
+<file path=ppt/slides/slide7.xml><?xml version="1.0" encoding="utf-8"?>
+<p:sld xmlns:a="http://schemas.openxmlformats.org/drawingml/2006/main" xmlns:r="http://schemas.openxmlformats.org/officeDocument/2006/relationships" xmlns:p="http://schemas.openxmlformats.org/presentationml/2006/main">
+  <p:cSld>
+    <p:spTree>
+      <p:nvGrpSpPr>
+        <p:cNvPr id="1" name=""/>
+        <p:cNvGrpSpPr/>
+        <p:nvPr/>
+      </p:nvGrpSpPr>
+      <p:grpSpPr>
+        <a:xfrm>
+          <a:off x="0" y="0"/>
+          <a:ext cx="0" cy="0"/>
+          <a:chOff x="0" y="0"/>
+          <a:chExt cx="0" cy="0"/>
+        </a:xfrm>
+      </p:grpSpPr>
+      <p:sp>
+        <p:nvSpPr>
+          <p:cNvPr id="2" name="Title 1"/>
+          <p:cNvSpPr>
+            <a:spLocks noGrp="1"/>
+          </p:cNvSpPr>
+          <p:nvPr>
+            <p:ph type="title"/>
+          </p:nvPr>
+        </p:nvSpPr>
+        <p:spPr>
+          <a:xfrm>
+            <a:off x="457201" y="204787"/>
+            <a:ext cx="3008313" cy="871538"/>
+          </a:xfrm>
+        </p:spPr>
+        <p:txBody>
+          <a:bodyPr/>
+          <a:lstStyle/>
+          <a:p>
+            <a:pPr lvl="0" indent="0" marL="0">
+              <a:buNone/>
+            </a:pPr>
+            <a:r>
+              <a:rPr/>
+              <a:t>KNN Cross Validation Results</a:t>
+            </a:r>
+          </a:p>
+        </p:txBody>
+      </p:sp>
+      <p:sp>
+        <p:nvSpPr>
+          <p:cNvPr id="4" name="Text Placeholder 3"/>
+          <p:cNvSpPr>
+            <a:spLocks noGrp="1"/>
+          </p:cNvSpPr>
+          <p:nvPr>
+            <p:ph idx="2" sz="half" type="body"/>
+          </p:nvPr>
+        </p:nvSpPr>
+        <p:spPr/>
+        <p:txBody>
+          <a:bodyPr/>
+          <a:lstStyle/>
+          <a:p>
+            <a:pPr lvl="0"/>
+            <a:r>
+              <a:rPr/>
+              <a:t>Ten-fold cross-validation performed with the following possible k-values:</a:t>
+            </a:r>
+          </a:p>
+          <a:p>
+            <a:pPr lvl="1"/>
+            <a:r>
+              <a:rPr/>
+              <a:t>10, 50, 100, 200, 500, 1000, 5000</a:t>
+            </a:r>
+          </a:p>
+          <a:p>
+            <a:pPr lvl="1"/>
+            <a:r>
+              <a:rPr/>
+              <a:t>Chose wide range due to large amount of data</a:t>
+            </a:r>
+          </a:p>
+          <a:p>
+            <a:pPr lvl="0"/>
+            <a:r>
+              <a:rPr/>
+              <a:t>Cross-validation used to pick the k-value returning the best accuracy, which was k=50</a:t>
+            </a:r>
+          </a:p>
+          <a:p>
+            <a:pPr lvl="0"/>
+            <a:r>
+              <a:rPr/>
+              <a:t>Accuracy decreased significantly for k &gt; 50</a:t>
+            </a:r>
+          </a:p>
+        </p:txBody>
+      </p:sp>
+      <p:pic>
+        <p:nvPicPr>
+          <p:cNvPr descr="Presentation_files/figure-pptx/knn_cv-1.png" id="0" name="Picture 1"/>
+          <p:cNvPicPr>
+            <a:picLocks noGrp="1" noChangeAspect="1"/>
+          </p:cNvPicPr>
+          <p:nvPr/>
+        </p:nvPicPr>
+        <p:blipFill>
+          <a:blip r:embed="rId2"/>
+          <a:stretch>
+            <a:fillRect/>
+          </a:stretch>
+        </p:blipFill>
+        <p:spPr bwMode="auto">
+          <a:xfrm>
+            <a:off x="3568700" y="482600"/>
+            <a:ext cx="5105400" cy="3835400"/>
+          </a:xfrm>
+          <a:prstGeom prst="rect">
+            <a:avLst/>
+          </a:prstGeom>
+          <a:noFill/>
+          <a:ln w="9525">
+            <a:noFill/>
+            <a:headEnd/>
+            <a:tailEnd/>
+          </a:ln>
+        </p:spPr>
+      </p:pic>
+    </p:spTree>
+  </p:cSld>
+</p:sld>
+</file>
+
+<file path=ppt/slides/slide8.xml><?xml version="1.0" encoding="utf-8"?>
+<p:sld xmlns:a="http://schemas.openxmlformats.org/drawingml/2006/main" xmlns:r="http://schemas.openxmlformats.org/officeDocument/2006/relationships" xmlns:p="http://schemas.openxmlformats.org/presentationml/2006/main">
+  <p:cSld>
+    <p:spTree>
+      <p:nvGrpSpPr>
+        <p:cNvPr id="1" name=""/>
+        <p:cNvGrpSpPr/>
+        <p:nvPr/>
+      </p:nvGrpSpPr>
+      <p:grpSpPr>
+        <a:xfrm>
+          <a:off x="0" y="0"/>
+          <a:ext cx="0" cy="0"/>
+          <a:chOff x="0" y="0"/>
+          <a:chExt cx="0" cy="0"/>
+        </a:xfrm>
+      </p:grpSpPr>
+      <p:sp>
+        <p:nvSpPr>
+          <p:cNvPr id="2" name="Title 1"/>
+          <p:cNvSpPr>
+            <a:spLocks noGrp="1"/>
+          </p:cNvSpPr>
+          <p:nvPr>
+            <p:ph type="title"/>
+          </p:nvPr>
+        </p:nvSpPr>
+        <p:spPr/>
+        <p:txBody>
+          <a:bodyPr/>
+          <a:lstStyle/>
+          <a:p>
+            <a:pPr lvl="0" indent="0" marL="0">
+              <a:buNone/>
+            </a:pPr>
+            <a:r>
+              <a:rPr/>
+              <a:t>KNN Model Performance</a:t>
+            </a:r>
+          </a:p>
+        </p:txBody>
+      </p:sp>
+      <p:graphicFrame>
+        <p:nvGraphicFramePr>
+          <p:cNvPr id="6" name="Content Placeholder 5"/>
+          <p:cNvGraphicFramePr>
+            <a:graphicFrameLocks noGrp="1"/>
+          </p:cNvGraphicFramePr>
+          <p:nvPr>
+            <p:ph idx="1"/>
+          </p:nvPr>
+        </p:nvGraphicFramePr>
+        <p:xfrm>
+          <a:off x="457200" y="1193800"/>
+          <a:ext cx="8229600" cy="3390900"/>
+        </p:xfrm>
+        <a:graphic>
+          <a:graphicData uri="http://schemas.openxmlformats.org/drawingml/2006/table">
+            <a:tbl>
+              <a:tblPr firstRow="1" bandRow="1">
+                <a:tableStyleId>{5C22544A-7EE6-4342-B048-85BDC9FD1C3A}</a:tableStyleId>
+              </a:tblPr>
+              <a:tblGrid>
+                <a:gridCol w="2057400"/>
+                <a:gridCol w="2057400"/>
+                <a:gridCol w="2057400"/>
+                <a:gridCol w="2057400"/>
+              </a:tblGrid>
+              <a:tr h="0">
+                <a:tc>
+                  <a:txBody>
+                    <a:bodyPr/>
+                    <a:lstStyle/>
+                    <a:p>
+                      <a:pPr lvl="0" indent="0" marL="0" algn="l">
+                        <a:buNone/>
+                      </a:pPr>
+                      <a:r>
+                        <a:rPr/>
+                        <a:t>Truth</a:t>
+                      </a:r>
+                    </a:p>
+                  </a:txBody>
+                  <a:tcPr/>
+                </a:tc>
+                <a:tc>
+                  <a:txBody>
+                    <a:bodyPr/>
+                    <a:lstStyle/>
+                    <a:p>
+                      <a:pPr lvl="0" indent="0" marL="0" algn="r">
+                        <a:buNone/>
+                      </a:pPr>
+                      <a:r>
+                        <a:rPr/>
+                        <a:t>total</a:t>
+                      </a:r>
+                    </a:p>
+                  </a:txBody>
+                  <a:tcPr/>
+                </a:tc>
+                <a:tc>
+                  <a:txBody>
+                    <a:bodyPr/>
+                    <a:lstStyle/>
+                    <a:p>
+                      <a:pPr lvl="0" indent="0" marL="0" algn="r">
+                        <a:buNone/>
+                      </a:pPr>
+                      <a:r>
+                        <a:rPr/>
+                        <a:t>correct</a:t>
+                      </a:r>
+                    </a:p>
+                  </a:txBody>
+                  <a:tcPr/>
+                </a:tc>
+                <a:tc>
+                  <a:txBody>
+                    <a:bodyPr/>
+                    <a:lstStyle/>
+                    <a:p>
+                      <a:pPr lvl="0" indent="0" marL="0" algn="r">
+                        <a:buNone/>
+                      </a:pPr>
+                      <a:r>
+                        <a:rPr/>
+                        <a:t>prop_correct</a:t>
+                      </a:r>
+                    </a:p>
+                  </a:txBody>
+                  <a:tcPr/>
+                </a:tc>
+              </a:tr>
+              <a:tr h="0">
+                <a:tc>
+                  <a:txBody>
+                    <a:bodyPr/>
+                    <a:lstStyle/>
+                    <a:p>
+                      <a:pPr lvl="0" indent="0" marL="0" algn="l">
+                        <a:buNone/>
+                      </a:pPr>
+                      <a:r>
+                        <a:rPr/>
+                        <a:t>BATTERY</a:t>
+                      </a:r>
+                    </a:p>
+                  </a:txBody>
+                </a:tc>
+                <a:tc>
+                  <a:txBody>
+                    <a:bodyPr/>
+                    <a:lstStyle/>
+                    <a:p>
+                      <a:pPr lvl="0" indent="0" marL="0" algn="r">
+                        <a:buNone/>
+                      </a:pPr>
+                      <a:r>
+                        <a:rPr/>
+                        <a:t>1234</a:t>
+                      </a:r>
+                    </a:p>
+                  </a:txBody>
+                </a:tc>
+                <a:tc>
+                  <a:txBody>
+                    <a:bodyPr/>
+                    <a:lstStyle/>
+                    <a:p>
+                      <a:pPr lvl="0" indent="0" marL="0" algn="r">
+                        <a:buNone/>
+                      </a:pPr>
+                      <a:r>
+                        <a:rPr/>
+                        <a:t>926</a:t>
+                      </a:r>
+                    </a:p>
+                  </a:txBody>
+                </a:tc>
+                <a:tc>
+                  <a:txBody>
+                    <a:bodyPr/>
+                    <a:lstStyle/>
+                    <a:p>
+                      <a:pPr lvl="0" indent="0" marL="0" algn="r">
+                        <a:buNone/>
+                      </a:pPr>
+                      <a:r>
+                        <a:rPr/>
+                        <a:t>0.750</a:t>
+                      </a:r>
+                    </a:p>
+                  </a:txBody>
+                </a:tc>
+              </a:tr>
+              <a:tr h="0">
+                <a:tc>
+                  <a:txBody>
+                    <a:bodyPr/>
+                    <a:lstStyle/>
+                    <a:p>
+                      <a:pPr lvl="0" indent="0" marL="0" algn="l">
+                        <a:buNone/>
+                      </a:pPr>
+                      <a:r>
+                        <a:rPr/>
+                        <a:t>BURGLARY</a:t>
+                      </a:r>
+                    </a:p>
+                  </a:txBody>
+                </a:tc>
+                <a:tc>
+                  <a:txBody>
+                    <a:bodyPr/>
+                    <a:lstStyle/>
+                    <a:p>
+                      <a:pPr lvl="0" indent="0" marL="0" algn="r">
+                        <a:buNone/>
+                      </a:pPr>
+                      <a:r>
+                        <a:rPr/>
+                        <a:t>877</a:t>
+                      </a:r>
+                    </a:p>
+                  </a:txBody>
+                </a:tc>
+                <a:tc>
+                  <a:txBody>
+                    <a:bodyPr/>
+                    <a:lstStyle/>
+                    <a:p>
+                      <a:pPr lvl="0" indent="0" marL="0" algn="r">
+                        <a:buNone/>
+                      </a:pPr>
+                      <a:r>
+                        <a:rPr/>
+                        <a:t>500</a:t>
+                      </a:r>
+                    </a:p>
+                  </a:txBody>
+                </a:tc>
+                <a:tc>
+                  <a:txBody>
+                    <a:bodyPr/>
+                    <a:lstStyle/>
+                    <a:p>
+                      <a:pPr lvl="0" indent="0" marL="0" algn="r">
+                        <a:buNone/>
+                      </a:pPr>
+                      <a:r>
+                        <a:rPr/>
+                        <a:t>0.570</a:t>
+                      </a:r>
+                    </a:p>
+                  </a:txBody>
+                </a:tc>
+              </a:tr>
+              <a:tr h="0">
+                <a:tc>
+                  <a:txBody>
+                    <a:bodyPr/>
+                    <a:lstStyle/>
+                    <a:p>
+                      <a:pPr lvl="0" indent="0" marL="0" algn="l">
+                        <a:buNone/>
+                      </a:pPr>
+                      <a:r>
+                        <a:rPr/>
+                        <a:t>DRUG MANUFACTURE</a:t>
+                      </a:r>
+                    </a:p>
+                  </a:txBody>
+                </a:tc>
+                <a:tc>
+                  <a:txBody>
+                    <a:bodyPr/>
+                    <a:lstStyle/>
+                    <a:p>
+                      <a:pPr lvl="0" indent="0" marL="0" algn="r">
+                        <a:buNone/>
+                      </a:pPr>
+                      <a:r>
+                        <a:rPr/>
+                        <a:t>485</a:t>
+                      </a:r>
+                    </a:p>
+                  </a:txBody>
+                </a:tc>
+                <a:tc>
+                  <a:txBody>
+                    <a:bodyPr/>
+                    <a:lstStyle/>
+                    <a:p>
+                      <a:pPr lvl="0" indent="0" marL="0" algn="r">
+                        <a:buNone/>
+                      </a:pPr>
+                      <a:r>
+                        <a:rPr/>
+                        <a:t>201</a:t>
+                      </a:r>
+                    </a:p>
+                  </a:txBody>
+                </a:tc>
+                <a:tc>
+                  <a:txBody>
+                    <a:bodyPr/>
+                    <a:lstStyle/>
+                    <a:p>
+                      <a:pPr lvl="0" indent="0" marL="0" algn="r">
+                        <a:buNone/>
+                      </a:pPr>
+                      <a:r>
+                        <a:rPr/>
+                        <a:t>0.414</a:t>
+                      </a:r>
+                    </a:p>
+                  </a:txBody>
+                </a:tc>
+              </a:tr>
+              <a:tr h="0">
+                <a:tc>
+                  <a:txBody>
+                    <a:bodyPr/>
+                    <a:lstStyle/>
+                    <a:p>
+                      <a:pPr lvl="0" indent="0" marL="0" algn="l">
+                        <a:buNone/>
+                      </a:pPr>
+                      <a:r>
+                        <a:rPr/>
+                        <a:t>DUI</a:t>
+                      </a:r>
+                    </a:p>
+                  </a:txBody>
+                </a:tc>
+                <a:tc>
+                  <a:txBody>
+                    <a:bodyPr/>
+                    <a:lstStyle/>
+                    <a:p>
+                      <a:pPr lvl="0" indent="0" marL="0" algn="r">
+                        <a:buNone/>
+                      </a:pPr>
+                      <a:r>
+                        <a:rPr/>
+                        <a:t>575</a:t>
+                      </a:r>
+                    </a:p>
+                  </a:txBody>
+                </a:tc>
+                <a:tc>
+                  <a:txBody>
+                    <a:bodyPr/>
+                    <a:lstStyle/>
+                    <a:p>
+                      <a:pPr lvl="0" indent="0" marL="0" algn="r">
+                        <a:buNone/>
+                      </a:pPr>
+                      <a:r>
+                        <a:rPr/>
+                        <a:t>213</a:t>
+                      </a:r>
+                    </a:p>
+                  </a:txBody>
+                </a:tc>
+                <a:tc>
+                  <a:txBody>
+                    <a:bodyPr/>
+                    <a:lstStyle/>
+                    <a:p>
+                      <a:pPr lvl="0" indent="0" marL="0" algn="r">
+                        <a:buNone/>
+                      </a:pPr>
+                      <a:r>
+                        <a:rPr/>
+                        <a:t>0.370</a:t>
+                      </a:r>
+                    </a:p>
+                  </a:txBody>
+                </a:tc>
+              </a:tr>
+              <a:tr h="0">
+                <a:tc>
+                  <a:txBody>
+                    <a:bodyPr/>
+                    <a:lstStyle/>
+                    <a:p>
+                      <a:pPr lvl="0" indent="0" marL="0" algn="l">
+                        <a:buNone/>
+                      </a:pPr>
+                      <a:r>
+                        <a:rPr/>
+                        <a:t>FORGERY</a:t>
+                      </a:r>
+                    </a:p>
+                  </a:txBody>
+                </a:tc>
+                <a:tc>
+                  <a:txBody>
+                    <a:bodyPr/>
+                    <a:lstStyle/>
+                    <a:p>
+                      <a:pPr lvl="0" indent="0" marL="0" algn="r">
+                        <a:buNone/>
+                      </a:pPr>
+                      <a:r>
+                        <a:rPr/>
+                        <a:t>68</a:t>
+                      </a:r>
+                    </a:p>
+                  </a:txBody>
+                </a:tc>
+                <a:tc>
+                  <a:txBody>
+                    <a:bodyPr/>
+                    <a:lstStyle/>
+                    <a:p>
+                      <a:pPr lvl="0" indent="0" marL="0" algn="r">
+                        <a:buNone/>
+                      </a:pPr>
+                      <a:r>
+                        <a:rPr/>
+                        <a:t>0</a:t>
+                      </a:r>
+                    </a:p>
+                  </a:txBody>
+                </a:tc>
+                <a:tc>
+                  <a:txBody>
+                    <a:bodyPr/>
+                    <a:lstStyle/>
+                    <a:p>
+                      <a:pPr lvl="0" indent="0" marL="0" algn="r">
+                        <a:buNone/>
+                      </a:pPr>
+                      <a:r>
+                        <a:rPr/>
+                        <a:t>0.000</a:t>
+                      </a:r>
+                    </a:p>
+                  </a:txBody>
+                </a:tc>
+              </a:tr>
+              <a:tr h="0">
+                <a:tc>
+                  <a:txBody>
+                    <a:bodyPr/>
+                    <a:lstStyle/>
+                    <a:p>
+                      <a:pPr lvl="0" indent="0" marL="0" algn="l">
+                        <a:buNone/>
+                      </a:pPr>
+                      <a:r>
+                        <a:rPr/>
+                        <a:t>HOME INVASION</a:t>
+                      </a:r>
+                    </a:p>
+                  </a:txBody>
+                </a:tc>
+                <a:tc>
+                  <a:txBody>
+                    <a:bodyPr/>
+                    <a:lstStyle/>
+                    <a:p>
+                      <a:pPr lvl="0" indent="0" marL="0" algn="r">
+                        <a:buNone/>
+                      </a:pPr>
+                      <a:r>
+                        <a:rPr/>
+                        <a:t>93</a:t>
+                      </a:r>
+                    </a:p>
+                  </a:txBody>
+                </a:tc>
+                <a:tc>
+                  <a:txBody>
+                    <a:bodyPr/>
+                    <a:lstStyle/>
+                    <a:p>
+                      <a:pPr lvl="0" indent="0" marL="0" algn="r">
+                        <a:buNone/>
+                      </a:pPr>
+                      <a:r>
+                        <a:rPr/>
+                        <a:t>7</a:t>
+                      </a:r>
+                    </a:p>
+                  </a:txBody>
+                </a:tc>
+                <a:tc>
+                  <a:txBody>
+                    <a:bodyPr/>
+                    <a:lstStyle/>
+                    <a:p>
+                      <a:pPr lvl="0" indent="0" marL="0" algn="r">
+                        <a:buNone/>
+                      </a:pPr>
+                      <a:r>
+                        <a:rPr/>
+                        <a:t>0.075</a:t>
+                      </a:r>
+                    </a:p>
+                  </a:txBody>
+                </a:tc>
+              </a:tr>
+              <a:tr h="0">
+                <a:tc>
+                  <a:txBody>
+                    <a:bodyPr/>
+                    <a:lstStyle/>
+                    <a:p>
+                      <a:pPr lvl="0" indent="0" marL="0" algn="l">
+                        <a:buNone/>
+                      </a:pPr>
+                      <a:r>
+                        <a:rPr/>
+                        <a:t>ILL. CONTR. SUBST. POSS</a:t>
+                      </a:r>
+                    </a:p>
+                  </a:txBody>
+                </a:tc>
+                <a:tc>
+                  <a:txBody>
+                    <a:bodyPr/>
+                    <a:lstStyle/>
+                    <a:p>
+                      <a:pPr lvl="0" indent="0" marL="0" algn="r">
+                        <a:buNone/>
+                      </a:pPr>
+                      <a:r>
+                        <a:rPr/>
+                        <a:t>1536</a:t>
+                      </a:r>
+                    </a:p>
+                  </a:txBody>
+                </a:tc>
+                <a:tc>
+                  <a:txBody>
+                    <a:bodyPr/>
+                    <a:lstStyle/>
+                    <a:p>
+                      <a:pPr lvl="0" indent="0" marL="0" algn="r">
+                        <a:buNone/>
+                      </a:pPr>
+                      <a:r>
+                        <a:rPr/>
+                        <a:t>1181</a:t>
+                      </a:r>
+                    </a:p>
+                  </a:txBody>
+                </a:tc>
+                <a:tc>
+                  <a:txBody>
+                    <a:bodyPr/>
+                    <a:lstStyle/>
+                    <a:p>
+                      <a:pPr lvl="0" indent="0" marL="0" algn="r">
+                        <a:buNone/>
+                      </a:pPr>
+                      <a:r>
+                        <a:rPr/>
+                        <a:t>0.769</a:t>
+                      </a:r>
+                    </a:p>
+                  </a:txBody>
+                </a:tc>
+              </a:tr>
+              <a:tr h="0">
+                <a:tc>
+                  <a:txBody>
+                    <a:bodyPr/>
+                    <a:lstStyle/>
+                    <a:p>
+                      <a:pPr lvl="0" indent="0" marL="0" algn="l">
+                        <a:buNone/>
+                      </a:pPr>
+                      <a:r>
+                        <a:rPr/>
+                        <a:t>ILLEGAL WEAPON USE/POSS</a:t>
+                      </a:r>
+                    </a:p>
+                  </a:txBody>
+                </a:tc>
+                <a:tc>
+                  <a:txBody>
+                    <a:bodyPr/>
+                    <a:lstStyle/>
+                    <a:p>
+                      <a:pPr lvl="0" indent="0" marL="0" algn="r">
+                        <a:buNone/>
+                      </a:pPr>
+                      <a:r>
+                        <a:rPr/>
+                        <a:t>1110</a:t>
+                      </a:r>
+                    </a:p>
+                  </a:txBody>
+                </a:tc>
+                <a:tc>
+                  <a:txBody>
+                    <a:bodyPr/>
+                    <a:lstStyle/>
+                    <a:p>
+                      <a:pPr lvl="0" indent="0" marL="0" algn="r">
+                        <a:buNone/>
+                      </a:pPr>
+                      <a:r>
+                        <a:rPr/>
+                        <a:t>818</a:t>
+                      </a:r>
+                    </a:p>
+                  </a:txBody>
+                </a:tc>
+                <a:tc>
+                  <a:txBody>
+                    <a:bodyPr/>
+                    <a:lstStyle/>
+                    <a:p>
+                      <a:pPr lvl="0" indent="0" marL="0" algn="r">
+                        <a:buNone/>
+                      </a:pPr>
+                      <a:r>
+                        <a:rPr/>
+                        <a:t>0.737</a:t>
+                      </a:r>
+                    </a:p>
+                  </a:txBody>
+                </a:tc>
+              </a:tr>
+              <a:tr h="0">
+                <a:tc>
+                  <a:txBody>
+                    <a:bodyPr/>
+                    <a:lstStyle/>
+                    <a:p>
+                      <a:pPr lvl="0" indent="0" marL="0" algn="l">
+                        <a:buNone/>
+                      </a:pPr>
+                      <a:r>
+                        <a:rPr/>
+                        <a:t>ILLEGAL/CHILD PORN</a:t>
+                      </a:r>
+                    </a:p>
+                  </a:txBody>
+                </a:tc>
+                <a:tc>
+                  <a:txBody>
+                    <a:bodyPr/>
+                    <a:lstStyle/>
+                    <a:p>
+                      <a:pPr lvl="0" indent="0" marL="0" algn="r">
+                        <a:buNone/>
+                      </a:pPr>
+                      <a:r>
+                        <a:rPr/>
+                        <a:t>51</a:t>
+                      </a:r>
+                    </a:p>
+                  </a:txBody>
+                </a:tc>
+                <a:tc>
+                  <a:txBody>
+                    <a:bodyPr/>
+                    <a:lstStyle/>
+                    <a:p>
+                      <a:pPr lvl="0" indent="0" marL="0" algn="r">
+                        <a:buNone/>
+                      </a:pPr>
+                      <a:r>
+                        <a:rPr/>
+                        <a:t>0</a:t>
+                      </a:r>
+                    </a:p>
+                  </a:txBody>
+                </a:tc>
+                <a:tc>
+                  <a:txBody>
+                    <a:bodyPr/>
+                    <a:lstStyle/>
+                    <a:p>
+                      <a:pPr lvl="0" indent="0" marL="0" algn="r">
+                        <a:buNone/>
+                      </a:pPr>
+                      <a:r>
+                        <a:rPr/>
+                        <a:t>0.000</a:t>
+                      </a:r>
+                    </a:p>
+                  </a:txBody>
+                </a:tc>
+              </a:tr>
+            </a:tbl>
+          </a:graphicData>
+        </a:graphic>
+      </p:graphicFrame>
+    </p:spTree>
+  </p:cSld>
+</p:sld>
+</file>
+
+<file path=ppt/slides/slide9.xml><?xml version="1.0" encoding="utf-8"?>
+<p:sld xmlns:a="http://schemas.openxmlformats.org/drawingml/2006/main" xmlns:r="http://schemas.openxmlformats.org/officeDocument/2006/relationships" xmlns:p="http://schemas.openxmlformats.org/presentationml/2006/main">
+  <p:cSld>
+    <p:spTree>
+      <p:nvGrpSpPr>
+        <p:cNvPr id="1" name=""/>
+        <p:cNvGrpSpPr/>
+        <p:nvPr/>
+      </p:nvGrpSpPr>
+      <p:grpSpPr>
+        <a:xfrm>
+          <a:off x="0" y="0"/>
+          <a:ext cx="0" cy="0"/>
+          <a:chOff x="0" y="0"/>
+          <a:chExt cx="0" cy="0"/>
+        </a:xfrm>
+      </p:grpSpPr>
+      <p:graphicFrame>
+        <p:nvGraphicFramePr>
+          <p:cNvPr id="6" name="Content Placeholder 5"/>
+          <p:cNvGraphicFramePr>
+            <a:graphicFrameLocks noGrp="1"/>
+          </p:cNvGraphicFramePr>
+          <p:nvPr>
+            <p:ph idx="1"/>
+          </p:nvPr>
+        </p:nvGraphicFramePr>
+        <p:xfrm>
+          <a:off x="457200" y="1193800"/>
+          <a:ext cx="8229600" cy="3390900"/>
+        </p:xfrm>
+        <a:graphic>
+          <a:graphicData uri="http://schemas.openxmlformats.org/drawingml/2006/table">
+            <a:tbl>
+              <a:tblPr firstRow="1" bandRow="1">
+                <a:tableStyleId>{5C22544A-7EE6-4342-B048-85BDC9FD1C3A}</a:tableStyleId>
+              </a:tblPr>
+              <a:tblGrid>
+                <a:gridCol w="2057400"/>
+                <a:gridCol w="2057400"/>
+                <a:gridCol w="2057400"/>
+                <a:gridCol w="2057400"/>
+              </a:tblGrid>
+              <a:tr h="0">
+                <a:tc>
+                  <a:txBody>
+                    <a:bodyPr/>
+                    <a:lstStyle/>
+                    <a:p>
+                      <a:pPr lvl="0" indent="0" marL="0" algn="l">
+                        <a:buNone/>
+                      </a:pPr>
+                      <a:r>
+                        <a:rPr/>
+                        <a:t>Truth</a:t>
+                      </a:r>
+                    </a:p>
+                  </a:txBody>
+                  <a:tcPr/>
+                </a:tc>
+                <a:tc>
+                  <a:txBody>
+                    <a:bodyPr/>
+                    <a:lstStyle/>
+                    <a:p>
+                      <a:pPr lvl="0" indent="0" marL="0" algn="r">
+                        <a:buNone/>
+                      </a:pPr>
+                      <a:r>
+                        <a:rPr/>
+                        <a:t>total</a:t>
+                      </a:r>
+                    </a:p>
+                  </a:txBody>
+                  <a:tcPr/>
+                </a:tc>
+                <a:tc>
+                  <a:txBody>
+                    <a:bodyPr/>
+                    <a:lstStyle/>
+                    <a:p>
+                      <a:pPr lvl="0" indent="0" marL="0" algn="r">
+                        <a:buNone/>
+                      </a:pPr>
+                      <a:r>
+                        <a:rPr/>
+                        <a:t>correct</a:t>
+                      </a:r>
+                    </a:p>
+                  </a:txBody>
+                  <a:tcPr/>
+                </a:tc>
+                <a:tc>
+                  <a:txBody>
+                    <a:bodyPr/>
+                    <a:lstStyle/>
+                    <a:p>
+                      <a:pPr lvl="0" indent="0" marL="0" algn="r">
+                        <a:buNone/>
+                      </a:pPr>
+                      <a:r>
+                        <a:rPr/>
+                        <a:t>prop_correct</a:t>
+                      </a:r>
+                    </a:p>
+                  </a:txBody>
+                  <a:tcPr/>
+                </a:tc>
+              </a:tr>
+              <a:tr h="0">
+                <a:tc>
+                  <a:txBody>
+                    <a:bodyPr/>
+                    <a:lstStyle/>
+                    <a:p>
+                      <a:pPr lvl="0" indent="0" marL="0" algn="l">
+                        <a:buNone/>
+                      </a:pPr>
+                      <a:r>
+                        <a:rPr/>
+                        <a:t>KIDNAPPING</a:t>
+                      </a:r>
+                    </a:p>
+                  </a:txBody>
+                </a:tc>
+                <a:tc>
+                  <a:txBody>
+                    <a:bodyPr/>
+                    <a:lstStyle/>
+                    <a:p>
+                      <a:pPr lvl="0" indent="0" marL="0" algn="r">
+                        <a:buNone/>
+                      </a:pPr>
+                      <a:r>
+                        <a:rPr/>
+                        <a:t>11</a:t>
+                      </a:r>
+                    </a:p>
+                  </a:txBody>
+                </a:tc>
+                <a:tc>
+                  <a:txBody>
+                    <a:bodyPr/>
+                    <a:lstStyle/>
+                    <a:p>
+                      <a:pPr lvl="0" indent="0" marL="0" algn="r">
+                        <a:buNone/>
+                      </a:pPr>
+                      <a:r>
+                        <a:rPr/>
+                        <a:t>1</a:t>
+                      </a:r>
+                    </a:p>
+                  </a:txBody>
+                </a:tc>
+                <a:tc>
+                  <a:txBody>
+                    <a:bodyPr/>
+                    <a:lstStyle/>
+                    <a:p>
+                      <a:pPr lvl="0" indent="0" marL="0" algn="r">
+                        <a:buNone/>
+                      </a:pPr>
+                      <a:r>
+                        <a:rPr/>
+                        <a:t>0.091</a:t>
+                      </a:r>
+                    </a:p>
+                  </a:txBody>
+                </a:tc>
+              </a:tr>
+              <a:tr h="0">
+                <a:tc>
+                  <a:txBody>
+                    <a:bodyPr/>
+                    <a:lstStyle/>
+                    <a:p>
+                      <a:pPr lvl="0" indent="0" marL="0" algn="l">
+                        <a:buNone/>
+                      </a:pPr>
+                      <a:r>
+                        <a:rPr/>
+                        <a:t>MURDER</a:t>
+                      </a:r>
+                    </a:p>
+                  </a:txBody>
+                </a:tc>
+                <a:tc>
+                  <a:txBody>
+                    <a:bodyPr/>
+                    <a:lstStyle/>
+                    <a:p>
+                      <a:pPr lvl="0" indent="0" marL="0" algn="r">
+                        <a:buNone/>
+                      </a:pPr>
+                      <a:r>
+                        <a:rPr/>
+                        <a:t>1359</a:t>
+                      </a:r>
+                    </a:p>
+                  </a:txBody>
+                </a:tc>
+                <a:tc>
+                  <a:txBody>
+                    <a:bodyPr/>
+                    <a:lstStyle/>
+                    <a:p>
+                      <a:pPr lvl="0" indent="0" marL="0" algn="r">
+                        <a:buNone/>
+                      </a:pPr>
+                      <a:r>
+                        <a:rPr/>
+                        <a:t>1242</a:t>
+                      </a:r>
+                    </a:p>
+                  </a:txBody>
+                </a:tc>
+                <a:tc>
+                  <a:txBody>
+                    <a:bodyPr/>
+                    <a:lstStyle/>
+                    <a:p>
+                      <a:pPr lvl="0" indent="0" marL="0" algn="r">
+                        <a:buNone/>
+                      </a:pPr>
+                      <a:r>
+                        <a:rPr/>
+                        <a:t>0.914</a:t>
+                      </a:r>
+                    </a:p>
+                  </a:txBody>
+                </a:tc>
+              </a:tr>
+              <a:tr h="0">
+                <a:tc>
+                  <a:txBody>
+                    <a:bodyPr/>
+                    <a:lstStyle/>
+                    <a:p>
+                      <a:pPr lvl="0" indent="0" marL="0" algn="l">
+                        <a:buNone/>
+                      </a:pPr>
+                      <a:r>
+                        <a:rPr/>
+                        <a:t>OBSTRUCTING JUSTICE</a:t>
+                      </a:r>
+                    </a:p>
+                  </a:txBody>
+                </a:tc>
+                <a:tc>
+                  <a:txBody>
+                    <a:bodyPr/>
+                    <a:lstStyle/>
+                    <a:p>
+                      <a:pPr lvl="0" indent="0" marL="0" algn="r">
+                        <a:buNone/>
+                      </a:pPr>
+                      <a:r>
+                        <a:rPr/>
+                        <a:t>112</a:t>
+                      </a:r>
+                    </a:p>
+                  </a:txBody>
+                </a:tc>
+                <a:tc>
+                  <a:txBody>
+                    <a:bodyPr/>
+                    <a:lstStyle/>
+                    <a:p>
+                      <a:pPr lvl="0" indent="0" marL="0" algn="r">
+                        <a:buNone/>
+                      </a:pPr>
+                      <a:r>
+                        <a:rPr/>
+                        <a:t>0</a:t>
+                      </a:r>
+                    </a:p>
+                  </a:txBody>
+                </a:tc>
+                <a:tc>
+                  <a:txBody>
+                    <a:bodyPr/>
+                    <a:lstStyle/>
+                    <a:p>
+                      <a:pPr lvl="0" indent="0" marL="0" algn="r">
+                        <a:buNone/>
+                      </a:pPr>
+                      <a:r>
+                        <a:rPr/>
+                        <a:t>0.000</a:t>
+                      </a:r>
+                    </a:p>
+                  </a:txBody>
+                </a:tc>
+              </a:tr>
+              <a:tr h="0">
+                <a:tc>
+                  <a:txBody>
+                    <a:bodyPr/>
+                    <a:lstStyle/>
+                    <a:p>
+                      <a:pPr lvl="0" indent="0" marL="0" algn="l">
+                        <a:buNone/>
+                      </a:pPr>
+                      <a:r>
+                        <a:rPr/>
+                        <a:t>OTHER</a:t>
+                      </a:r>
+                    </a:p>
+                  </a:txBody>
+                </a:tc>
+                <a:tc>
+                  <a:txBody>
+                    <a:bodyPr/>
+                    <a:lstStyle/>
+                    <a:p>
+                      <a:pPr lvl="0" indent="0" marL="0" algn="r">
+                        <a:buNone/>
+                      </a:pPr>
+                      <a:r>
+                        <a:rPr/>
+                        <a:t>1706</a:t>
+                      </a:r>
+                    </a:p>
+                  </a:txBody>
+                </a:tc>
+                <a:tc>
+                  <a:txBody>
+                    <a:bodyPr/>
+                    <a:lstStyle/>
+                    <a:p>
+                      <a:pPr lvl="0" indent="0" marL="0" algn="r">
+                        <a:buNone/>
+                      </a:pPr>
+                      <a:r>
+                        <a:rPr/>
+                        <a:t>854</a:t>
+                      </a:r>
+                    </a:p>
+                  </a:txBody>
+                </a:tc>
+                <a:tc>
+                  <a:txBody>
+                    <a:bodyPr/>
+                    <a:lstStyle/>
+                    <a:p>
+                      <a:pPr lvl="0" indent="0" marL="0" algn="r">
+                        <a:buNone/>
+                      </a:pPr>
+                      <a:r>
+                        <a:rPr/>
+                        <a:t>0.501</a:t>
+                      </a:r>
+                    </a:p>
+                  </a:txBody>
+                </a:tc>
+              </a:tr>
+              <a:tr h="0">
+                <a:tc>
+                  <a:txBody>
+                    <a:bodyPr/>
+                    <a:lstStyle/>
+                    <a:p>
+                      <a:pPr lvl="0" indent="0" marL="0" algn="l">
+                        <a:buNone/>
+                      </a:pPr>
+                      <a:r>
+                        <a:rPr/>
+                        <a:t>ROBBERY</a:t>
+                      </a:r>
+                    </a:p>
+                  </a:txBody>
+                </a:tc>
+                <a:tc>
+                  <a:txBody>
+                    <a:bodyPr/>
+                    <a:lstStyle/>
+                    <a:p>
+                      <a:pPr lvl="0" indent="0" marL="0" algn="r">
+                        <a:buNone/>
+                      </a:pPr>
+                      <a:r>
+                        <a:rPr/>
+                        <a:t>916</a:t>
+                      </a:r>
+                    </a:p>
+                  </a:txBody>
+                </a:tc>
+                <a:tc>
+                  <a:txBody>
+                    <a:bodyPr/>
+                    <a:lstStyle/>
+                    <a:p>
+                      <a:pPr lvl="0" indent="0" marL="0" algn="r">
+                        <a:buNone/>
+                      </a:pPr>
+                      <a:r>
+                        <a:rPr/>
+                        <a:t>555</a:t>
+                      </a:r>
+                    </a:p>
+                  </a:txBody>
+                </a:tc>
+                <a:tc>
+                  <a:txBody>
+                    <a:bodyPr/>
+                    <a:lstStyle/>
+                    <a:p>
+                      <a:pPr lvl="0" indent="0" marL="0" algn="r">
+                        <a:buNone/>
+                      </a:pPr>
+                      <a:r>
+                        <a:rPr/>
+                        <a:t>0.606</a:t>
+                      </a:r>
+                    </a:p>
+                  </a:txBody>
+                </a:tc>
+              </a:tr>
+              <a:tr h="0">
+                <a:tc>
+                  <a:txBody>
+                    <a:bodyPr/>
+                    <a:lstStyle/>
+                    <a:p>
+                      <a:pPr lvl="0" indent="0" marL="0" algn="l">
+                        <a:buNone/>
+                      </a:pPr>
+                      <a:r>
+                        <a:rPr/>
+                        <a:t>SEXUAL OFFENSE</a:t>
+                      </a:r>
+                    </a:p>
+                  </a:txBody>
+                </a:tc>
+                <a:tc>
+                  <a:txBody>
+                    <a:bodyPr/>
+                    <a:lstStyle/>
+                    <a:p>
+                      <a:pPr lvl="0" indent="0" marL="0" algn="r">
+                        <a:buNone/>
+                      </a:pPr>
+                      <a:r>
+                        <a:rPr/>
+                        <a:t>960</a:t>
+                      </a:r>
+                    </a:p>
+                  </a:txBody>
+                </a:tc>
+                <a:tc>
+                  <a:txBody>
+                    <a:bodyPr/>
+                    <a:lstStyle/>
+                    <a:p>
+                      <a:pPr lvl="0" indent="0" marL="0" algn="r">
+                        <a:buNone/>
+                      </a:pPr>
+                      <a:r>
+                        <a:rPr/>
+                        <a:t>691</a:t>
+                      </a:r>
+                    </a:p>
+                  </a:txBody>
+                </a:tc>
+                <a:tc>
+                  <a:txBody>
+                    <a:bodyPr/>
+                    <a:lstStyle/>
+                    <a:p>
+                      <a:pPr lvl="0" indent="0" marL="0" algn="r">
+                        <a:buNone/>
+                      </a:pPr>
+                      <a:r>
+                        <a:rPr/>
+                        <a:t>0.720</a:t>
+                      </a:r>
+                    </a:p>
+                  </a:txBody>
+                </a:tc>
+              </a:tr>
+              <a:tr h="0">
+                <a:tc>
+                  <a:txBody>
+                    <a:bodyPr/>
+                    <a:lstStyle/>
+                    <a:p>
+                      <a:pPr lvl="0" indent="0" marL="0" algn="l">
+                        <a:buNone/>
+                      </a:pPr>
+                      <a:r>
+                        <a:rPr/>
+                        <a:t>THEFT</a:t>
+                      </a:r>
+                    </a:p>
+                  </a:txBody>
+                </a:tc>
+                <a:tc>
+                  <a:txBody>
+                    <a:bodyPr/>
+                    <a:lstStyle/>
+                    <a:p>
+                      <a:pPr lvl="0" indent="0" marL="0" algn="r">
+                        <a:buNone/>
+                      </a:pPr>
+                      <a:r>
+                        <a:rPr/>
+                        <a:t>582</a:t>
+                      </a:r>
+                    </a:p>
+                  </a:txBody>
+                </a:tc>
+                <a:tc>
+                  <a:txBody>
+                    <a:bodyPr/>
+                    <a:lstStyle/>
+                    <a:p>
+                      <a:pPr lvl="0" indent="0" marL="0" algn="r">
+                        <a:buNone/>
+                      </a:pPr>
+                      <a:r>
+                        <a:rPr/>
+                        <a:t>185</a:t>
+                      </a:r>
+                    </a:p>
+                  </a:txBody>
+                </a:tc>
+                <a:tc>
+                  <a:txBody>
+                    <a:bodyPr/>
+                    <a:lstStyle/>
+                    <a:p>
+                      <a:pPr lvl="0" indent="0" marL="0" algn="r">
+                        <a:buNone/>
+                      </a:pPr>
+                      <a:r>
+                        <a:rPr/>
+                        <a:t>0.318</a:t>
+                      </a:r>
+                    </a:p>
+                  </a:txBody>
+                </a:tc>
+              </a:tr>
+              <a:tr h="0">
+                <a:tc>
+                  <a:txBody>
+                    <a:bodyPr/>
+                    <a:lstStyle/>
+                    <a:p>
+                      <a:pPr lvl="0" indent="0" marL="0" algn="l">
+                        <a:buNone/>
+                      </a:pPr>
+                      <a:r>
+                        <a:rPr/>
+                        <a:t>VEHICULAR HIJACKING/THEFT</a:t>
+                      </a:r>
+                    </a:p>
+                  </a:txBody>
+                </a:tc>
+                <a:tc>
+                  <a:txBody>
+                    <a:bodyPr/>
+                    <a:lstStyle/>
+                    <a:p>
+                      <a:pPr lvl="0" indent="0" marL="0" algn="r">
+                        <a:buNone/>
+                      </a:pPr>
+                      <a:r>
+                        <a:rPr/>
+                        <a:t>194</a:t>
+                      </a:r>
+                    </a:p>
+                  </a:txBody>
+                </a:tc>
+                <a:tc>
+                  <a:txBody>
+                    <a:bodyPr/>
+                    <a:lstStyle/>
+                    <a:p>
+                      <a:pPr lvl="0" indent="0" marL="0" algn="r">
+                        <a:buNone/>
+                      </a:pPr>
+                      <a:r>
+                        <a:rPr/>
+                        <a:t>17</a:t>
+                      </a:r>
+                    </a:p>
+                  </a:txBody>
+                </a:tc>
+                <a:tc>
+                  <a:txBody>
+                    <a:bodyPr/>
+                    <a:lstStyle/>
+                    <a:p>
+                      <a:pPr lvl="0" indent="0" marL="0" algn="r">
+                        <a:buNone/>
+                      </a:pPr>
+                      <a:r>
+                        <a:rPr/>
+                        <a:t>0.088</a:t>
+                      </a:r>
+                    </a:p>
+                  </a:txBody>
+                </a:tc>
+              </a:tr>
+            </a:tbl>
+          </a:graphicData>
+        </a:graphic>
+      </p:graphicFrame>
     </p:spTree>
   </p:cSld>
 </p:sld>

</xml_diff>

<commit_message>
add conclusion and references
</commit_message>
<xml_diff>
--- a/Presentation/Presentation.pptx
+++ b/Presentation/Presentation.pptx
@@ -5284,6 +5284,50 @@
           </a:p>
         </p:txBody>
       </p:sp>
+      <p:sp>
+        <p:nvSpPr>
+          <p:cNvPr id="3" name="Content Placeholder 2"/>
+          <p:cNvSpPr>
+            <a:spLocks noGrp="1"/>
+          </p:cNvSpPr>
+          <p:nvPr>
+            <p:ph idx="1"/>
+          </p:nvPr>
+        </p:nvSpPr>
+        <p:spPr/>
+        <p:txBody>
+          <a:bodyPr/>
+          <a:lstStyle/>
+          <a:p>
+            <a:pPr lvl="0"/>
+            <a:r>
+              <a:rPr/>
+              <a:t>The relationship between prison sentence and our predictors is likely not linear</a:t>
+            </a:r>
+          </a:p>
+          <a:p>
+            <a:pPr lvl="1"/>
+            <a:r>
+              <a:rPr/>
+              <a:t>random forest performed best, followed by GAM, and then linear regression</a:t>
+            </a:r>
+          </a:p>
+          <a:p>
+            <a:pPr lvl="0"/>
+            <a:r>
+              <a:rPr/>
+              <a:t>The best predictors of prison sentence are year admitted, parent institution, total counts charged, prior sentencing time, and criminal class, and offense category</a:t>
+            </a:r>
+          </a:p>
+          <a:p>
+            <a:pPr lvl="1"/>
+            <a:r>
+              <a:rPr/>
+              <a:t>demographic data like race, sex, and weight are less helpful predictors</a:t>
+            </a:r>
+          </a:p>
+        </p:txBody>
+      </p:sp>
     </p:spTree>
   </p:cSld>
 </p:sld>
@@ -5351,7 +5395,34 @@
             </a:pPr>
             <a:r>
               <a:rPr/>
-              <a:t>-https://www.kaggle.com/datasets/davidjfisher/illinois-doc-labeled-faces-dataset -https://www.idoc.state.il.us</a:t>
+              <a:t>Fisher, David. 2019. Illinois DOC labeled faces dataset, Version 1. Retrieved 11/19/2025 from </a:t>
+            </a:r>
+            <a:r>
+              <a:rPr>
+                <a:hlinkClick r:id="rId2"/>
+              </a:rPr>
+              <a:t>https://www.kaggle.com/datasets/davidjfisher/illinois-doc-labeled-faces-dataset/data</a:t>
+            </a:r>
+            <a:r>
+              <a:rPr/>
+              <a:t>.</a:t>
+            </a:r>
+          </a:p>
+          <a:p>
+            <a:pPr lvl="0" indent="0" marL="0">
+              <a:buNone/>
+            </a:pPr>
+            <a:r>
+              <a:rPr/>
+              <a:t>Death Penalty Information Center. (2023). </a:t>
+            </a:r>
+            <a:r>
+              <a:rPr i="1"/>
+              <a:t>Time on Death Row</a:t>
+            </a:r>
+            <a:r>
+              <a:rPr/>
+              <a:t>. Death Penalty Information Center; Death Penalty Information Center. https://deathpenaltyinfo.org/death-row/death-row-time-on-death-row.</a:t>
             </a:r>
           </a:p>
         </p:txBody>
@@ -5470,7 +5541,7 @@
             </a:pPr>
             <a:r>
               <a:rPr/>
-              <a:t>Our data comes from Kaggle, it consists of 3 CSV files with data scraped off the Illinois Department Of Corrections website.</a:t>
+              <a:t>Our data comes from Kaggle, with data scraped off the Illinois Department Of Corrections website.</a:t>
             </a:r>
           </a:p>
           <a:p>

</xml_diff>

<commit_message>
readme + my part of paper
Added some updates to the readme instructions for slide reproducibility, made sure slides render, and worked on my part of the paper.
</commit_message>
<xml_diff>
--- a/Presentation/Presentation.pptx
+++ b/Presentation/Presentation.pptx
@@ -4314,7 +4314,7 @@
       </p:graphicFrame>
       <p:pic>
         <p:nvPicPr>
-          <p:cNvPr descr="Presentation_files/figure-pptx/unnamed-chunk-4-1.png" id="0" name="Picture 1"/>
+          <p:cNvPr descr="Presentation_files/figure-pptx/unnamed-chunk-3-1.png" id="0" name="Picture 1"/>
           <p:cNvPicPr>
             <a:picLocks noGrp="1" noChangeAspect="1"/>
           </p:cNvPicPr>
@@ -4460,9 +4460,25 @@
               </a:p>
               <a:p>
                 <a:pPr lvl="0"/>
+                <a14:m>
+                  <m:oMath xmlns:m="http://schemas.openxmlformats.org/officeDocument/2006/math">
+                    <m:sSup>
+                      <m:e>
+                        <m:r>
+                          <m:t>R</m:t>
+                        </m:r>
+                      </m:e>
+                      <m:sup>
+                        <m:r>
+                          <m:t>2</m:t>
+                        </m:r>
+                      </m:sup>
+                    </m:sSup>
+                  </m:oMath>
+                </a14:m>
                 <a:r>
                   <a:rPr/>
-                  <a:t>R^2=0.7139504</a:t>
+                  <a:t>=0.7139504</a:t>
                 </a:r>
               </a:p>
               <a:p>
@@ -4950,7 +4966,7 @@
       </p:sp>
       <p:pic>
         <p:nvPicPr>
-          <p:cNvPr descr="Presentation_files/figure-pptx/unnamed-chunk-5-1.png" id="0" name="Picture 1"/>
+          <p:cNvPr descr="Presentation_files/figure-pptx/unnamed-chunk-4-1.png" id="0" name="Picture 1"/>
           <p:cNvPicPr>
             <a:picLocks noGrp="1" noChangeAspect="1"/>
           </p:cNvPicPr>
@@ -5090,7 +5106,7 @@
       </mc:AlternateContent>
       <p:pic>
         <p:nvPicPr>
-          <p:cNvPr descr="Presentation_files/figure-pptx/unnamed-chunk-6-1.png" id="0" name="Picture 1"/>
+          <p:cNvPr descr="Presentation_files/figure-pptx/unnamed-chunk-5-1.png" id="0" name="Picture 1"/>
           <p:cNvPicPr>
             <a:picLocks noGrp="1" noChangeAspect="1"/>
           </p:cNvPicPr>
@@ -5209,7 +5225,7 @@
       </p:sp>
       <p:pic>
         <p:nvPicPr>
-          <p:cNvPr descr="Presentation_files/figure-pptx/unnamed-chunk-7-1.png" id="0" name="Picture 1"/>
+          <p:cNvPr descr="Presentation_files/figure-pptx/unnamed-chunk-6-1.png" id="0" name="Picture 1"/>
           <p:cNvPicPr>
             <a:picLocks noGrp="1" noChangeAspect="1"/>
           </p:cNvPicPr>
@@ -5852,7 +5868,7 @@
       </p:sp>
       <p:pic>
         <p:nvPicPr>
-          <p:cNvPr descr="Presentation_files/figure-pptx/unnamed-chunk-8-1.png" id="0" name="Picture 1"/>
+          <p:cNvPr descr="Presentation_files/figure-pptx/unnamed-chunk-7-1.png" id="0" name="Picture 1"/>
           <p:cNvPicPr>
             <a:picLocks noGrp="1" noChangeAspect="1"/>
           </p:cNvPicPr>

</xml_diff>